<commit_message>
Added new Friction picture
</commit_message>
<xml_diff>
--- a/RA-L/pictures/pdf/friction.pptx
+++ b/RA-L/pictures/pdf/friction.pptx
@@ -4457,42 +4457,6 @@
           </a:p>
         </p:txBody>
       </p:sp>
-      <p:cxnSp>
-        <p:nvCxnSpPr>
-          <p:cNvPr id="60" name="Straight Arrow Connector 59"/>
-          <p:cNvCxnSpPr/>
-          <p:nvPr/>
-        </p:nvCxnSpPr>
-        <p:spPr>
-          <a:xfrm>
-            <a:off x="11531503" y="2966290"/>
-            <a:ext cx="1979310" cy="0"/>
-          </a:xfrm>
-          <a:prstGeom prst="straightConnector1">
-            <a:avLst/>
-          </a:prstGeom>
-          <a:ln w="57150" cmpd="sng">
-            <a:solidFill>
-              <a:srgbClr val="000000"/>
-            </a:solidFill>
-            <a:tailEnd type="stealth" w="med" len="lg"/>
-          </a:ln>
-        </p:spPr>
-        <p:style>
-          <a:lnRef idx="2">
-            <a:schemeClr val="accent1"/>
-          </a:lnRef>
-          <a:fillRef idx="0">
-            <a:schemeClr val="accent1"/>
-          </a:fillRef>
-          <a:effectRef idx="1">
-            <a:schemeClr val="accent1"/>
-          </a:effectRef>
-          <a:fontRef idx="minor">
-            <a:schemeClr val="tx1"/>
-          </a:fontRef>
-        </p:style>
-      </p:cxnSp>
       <p:sp>
         <p:nvSpPr>
           <p:cNvPr id="61" name="Oval 60"/>
@@ -4542,14 +4506,14 @@
       </p:sp>
       <p:cxnSp>
         <p:nvCxnSpPr>
-          <p:cNvPr id="62" name="Straight Arrow Connector 61"/>
+          <p:cNvPr id="65" name="Straight Arrow Connector 64"/>
           <p:cNvCxnSpPr/>
           <p:nvPr/>
         </p:nvCxnSpPr>
         <p:spPr>
-          <a:xfrm>
-            <a:off x="10304795" y="992547"/>
-            <a:ext cx="1979310" cy="659820"/>
+          <a:xfrm flipV="1">
+            <a:off x="11531503" y="2965441"/>
+            <a:ext cx="1035449" cy="6713"/>
           </a:xfrm>
           <a:prstGeom prst="straightConnector1">
             <a:avLst/>
@@ -4578,66 +4542,62 @@
       </p:cxnSp>
       <p:sp>
         <p:nvSpPr>
-          <p:cNvPr id="63" name="TextBox 62"/>
-          <p:cNvSpPr txBox="1"/>
+          <p:cNvPr id="5" name="Arc 4"/>
+          <p:cNvSpPr/>
           <p:nvPr/>
         </p:nvSpPr>
         <p:spPr>
-          <a:xfrm>
-            <a:off x="11280992" y="368448"/>
-            <a:ext cx="468025" cy="707886"/>
-          </a:xfrm>
-          <a:prstGeom prst="rect">
+          <a:xfrm rot="5400000">
+            <a:off x="9220053" y="-245194"/>
+            <a:ext cx="4622899" cy="3023403"/>
+          </a:xfrm>
+          <a:prstGeom prst="arc">
+            <a:avLst>
+              <a:gd name="adj1" fmla="val 16270353"/>
+              <a:gd name="adj2" fmla="val 12981"/>
+            </a:avLst>
+          </a:prstGeom>
+          <a:noFill/>
+        </p:spPr>
+        <p:style>
+          <a:lnRef idx="2">
+            <a:schemeClr val="accent1"/>
+          </a:lnRef>
+          <a:fillRef idx="0">
+            <a:schemeClr val="accent1"/>
+          </a:fillRef>
+          <a:effectRef idx="1">
+            <a:schemeClr val="accent1"/>
+          </a:effectRef>
+          <a:fontRef idx="minor">
+            <a:schemeClr val="tx1"/>
+          </a:fontRef>
+        </p:style>
+        <p:txBody>
+          <a:bodyPr rtlCol="0" anchor="ctr"/>
+          <a:lstStyle/>
+          <a:p>
+            <a:pPr algn="ctr"/>
+            <a:endParaRPr lang="en-US"/>
+          </a:p>
+        </p:txBody>
+      </p:sp>
+      <p:cxnSp>
+        <p:nvCxnSpPr>
+          <p:cNvPr id="14" name="Straight Connector 13"/>
+          <p:cNvCxnSpPr>
+            <a:stCxn id="5" idx="0"/>
+          </p:cNvCxnSpPr>
+          <p:nvPr/>
+        </p:nvCxnSpPr>
+        <p:spPr>
+          <a:xfrm flipV="1">
+            <a:off x="13043069" y="0"/>
+            <a:ext cx="135" cy="1297446"/>
+          </a:xfrm>
+          <a:prstGeom prst="line">
             <a:avLst/>
           </a:prstGeom>
-          <a:noFill/>
-        </p:spPr>
-        <p:txBody>
-          <a:bodyPr wrap="square" rtlCol="0">
-            <a:spAutoFit/>
-          </a:bodyPr>
-          <a:lstStyle/>
-          <a:p>
-            <a:r>
-              <a:rPr lang="en-US" sz="4000" i="1" dirty="0" smtClean="0">
-                <a:solidFill>
-                  <a:srgbClr val="000000"/>
-                </a:solidFill>
-                <a:latin typeface="Times New Roman"/>
-                <a:cs typeface="Times New Roman"/>
-              </a:rPr>
-              <a:t>F</a:t>
-            </a:r>
-            <a:endParaRPr lang="en-US" sz="4000" i="1" dirty="0">
-              <a:solidFill>
-                <a:srgbClr val="000000"/>
-              </a:solidFill>
-              <a:latin typeface="Times New Roman"/>
-              <a:cs typeface="Times New Roman"/>
-            </a:endParaRPr>
-          </a:p>
-        </p:txBody>
-      </p:sp>
-      <p:cxnSp>
-        <p:nvCxnSpPr>
-          <p:cNvPr id="64" name="Straight Arrow Connector 63"/>
-          <p:cNvCxnSpPr/>
-          <p:nvPr/>
-        </p:nvCxnSpPr>
-        <p:spPr>
-          <a:xfrm flipH="1">
-            <a:off x="11889619" y="2965440"/>
-            <a:ext cx="1606011" cy="17355"/>
-          </a:xfrm>
-          <a:prstGeom prst="straightConnector1">
-            <a:avLst/>
-          </a:prstGeom>
-          <a:ln w="57150" cmpd="sng">
-            <a:solidFill>
-              <a:srgbClr val="FF0000"/>
-            </a:solidFill>
-            <a:tailEnd type="stealth" w="med" len="lg"/>
-          </a:ln>
         </p:spPr>
         <p:style>
           <a:lnRef idx="2">
@@ -4656,23 +4616,20 @@
       </p:cxnSp>
       <p:cxnSp>
         <p:nvCxnSpPr>
-          <p:cNvPr id="65" name="Straight Arrow Connector 64"/>
+          <p:cNvPr id="16" name="Straight Connector 15"/>
           <p:cNvCxnSpPr/>
           <p:nvPr/>
         </p:nvCxnSpPr>
         <p:spPr>
-          <a:xfrm>
-            <a:off x="11531503" y="2972154"/>
-            <a:ext cx="358116" cy="10641"/>
-          </a:xfrm>
-          <a:prstGeom prst="straightConnector1">
+          <a:xfrm flipV="1">
+            <a:off x="9535230" y="1536591"/>
+            <a:ext cx="4180770" cy="71224"/>
+          </a:xfrm>
+          <a:prstGeom prst="line">
             <a:avLst/>
           </a:prstGeom>
-          <a:ln w="57150" cmpd="sng">
-            <a:solidFill>
-              <a:srgbClr val="008000"/>
-            </a:solidFill>
-            <a:tailEnd type="stealth" w="med" len="lg"/>
+          <a:ln>
+            <a:prstDash val="dash"/>
           </a:ln>
         </p:spPr>
         <p:style>
@@ -4690,30 +4647,26 @@
           </a:fontRef>
         </p:style>
       </p:cxnSp>
-      <p:sp>
-        <p:nvSpPr>
-          <p:cNvPr id="5" name="Arc 4"/>
-          <p:cNvSpPr/>
+      <p:cxnSp>
+        <p:nvCxnSpPr>
+          <p:cNvPr id="82" name="Straight Arrow Connector 81"/>
+          <p:cNvCxnSpPr/>
           <p:nvPr/>
-        </p:nvSpPr>
-        <p:spPr>
-          <a:xfrm>
-            <a:off x="11335236" y="1965068"/>
-            <a:ext cx="5173012" cy="3322085"/>
-          </a:xfrm>
-          <a:prstGeom prst="arc">
-            <a:avLst>
-              <a:gd name="adj1" fmla="val 10854817"/>
-              <a:gd name="adj2" fmla="val 15813799"/>
-            </a:avLst>
+        </p:nvCxnSpPr>
+        <p:spPr>
+          <a:xfrm flipV="1">
+            <a:off x="11531503" y="3341240"/>
+            <a:ext cx="720973" cy="1"/>
+          </a:xfrm>
+          <a:prstGeom prst="straightConnector1">
+            <a:avLst/>
           </a:prstGeom>
-          <a:solidFill>
-            <a:schemeClr val="tx2">
-              <a:lumMod val="60000"/>
-              <a:lumOff val="40000"/>
-              <a:alpha val="41000"/>
-            </a:schemeClr>
-          </a:solidFill>
+          <a:ln w="57150" cmpd="sng">
+            <a:solidFill>
+              <a:schemeClr val="tx1"/>
+            </a:solidFill>
+            <a:tailEnd type="stealth" w="med" len="lg"/>
+          </a:ln>
         </p:spPr>
         <p:style>
           <a:lnRef idx="2">
@@ -4729,12 +4682,486 @@
             <a:schemeClr val="tx1"/>
           </a:fontRef>
         </p:style>
-        <p:txBody>
-          <a:bodyPr rtlCol="0" anchor="ctr"/>
-          <a:lstStyle/>
-          <a:p>
-            <a:pPr algn="ctr"/>
-            <a:endParaRPr lang="en-US"/>
+      </p:cxnSp>
+      <p:cxnSp>
+        <p:nvCxnSpPr>
+          <p:cNvPr id="109" name="Straight Arrow Connector 108"/>
+          <p:cNvCxnSpPr/>
+          <p:nvPr/>
+        </p:nvCxnSpPr>
+        <p:spPr>
+          <a:xfrm flipV="1">
+            <a:off x="11531503" y="2589025"/>
+            <a:ext cx="1265259" cy="16079"/>
+          </a:xfrm>
+          <a:prstGeom prst="straightConnector1">
+            <a:avLst/>
+          </a:prstGeom>
+          <a:ln w="57150" cmpd="sng">
+            <a:solidFill>
+              <a:schemeClr val="tx1"/>
+            </a:solidFill>
+            <a:tailEnd type="stealth" w="med" len="lg"/>
+          </a:ln>
+        </p:spPr>
+        <p:style>
+          <a:lnRef idx="2">
+            <a:schemeClr val="accent1"/>
+          </a:lnRef>
+          <a:fillRef idx="0">
+            <a:schemeClr val="accent1"/>
+          </a:fillRef>
+          <a:effectRef idx="1">
+            <a:schemeClr val="accent1"/>
+          </a:effectRef>
+          <a:fontRef idx="minor">
+            <a:schemeClr val="tx1"/>
+          </a:fontRef>
+        </p:style>
+      </p:cxnSp>
+      <p:cxnSp>
+        <p:nvCxnSpPr>
+          <p:cNvPr id="110" name="Straight Arrow Connector 109"/>
+          <p:cNvCxnSpPr/>
+          <p:nvPr/>
+        </p:nvCxnSpPr>
+        <p:spPr>
+          <a:xfrm flipV="1">
+            <a:off x="11531503" y="2214471"/>
+            <a:ext cx="1398307" cy="16080"/>
+          </a:xfrm>
+          <a:prstGeom prst="straightConnector1">
+            <a:avLst/>
+          </a:prstGeom>
+          <a:ln w="57150" cmpd="sng">
+            <a:solidFill>
+              <a:schemeClr val="tx1"/>
+            </a:solidFill>
+            <a:tailEnd type="stealth" w="med" len="lg"/>
+          </a:ln>
+        </p:spPr>
+        <p:style>
+          <a:lnRef idx="2">
+            <a:schemeClr val="accent1"/>
+          </a:lnRef>
+          <a:fillRef idx="0">
+            <a:schemeClr val="accent1"/>
+          </a:fillRef>
+          <a:effectRef idx="1">
+            <a:schemeClr val="accent1"/>
+          </a:effectRef>
+          <a:fontRef idx="minor">
+            <a:schemeClr val="tx1"/>
+          </a:fontRef>
+        </p:style>
+      </p:cxnSp>
+      <p:cxnSp>
+        <p:nvCxnSpPr>
+          <p:cNvPr id="111" name="Straight Arrow Connector 110"/>
+          <p:cNvCxnSpPr/>
+          <p:nvPr/>
+        </p:nvCxnSpPr>
+        <p:spPr>
+          <a:xfrm>
+            <a:off x="11540015" y="1857480"/>
+            <a:ext cx="1424921" cy="0"/>
+          </a:xfrm>
+          <a:prstGeom prst="straightConnector1">
+            <a:avLst/>
+          </a:prstGeom>
+          <a:ln w="57150" cmpd="sng">
+            <a:solidFill>
+              <a:schemeClr val="tx1"/>
+            </a:solidFill>
+            <a:tailEnd type="stealth" w="med" len="lg"/>
+          </a:ln>
+        </p:spPr>
+        <p:style>
+          <a:lnRef idx="2">
+            <a:schemeClr val="accent1"/>
+          </a:lnRef>
+          <a:fillRef idx="0">
+            <a:schemeClr val="accent1"/>
+          </a:fillRef>
+          <a:effectRef idx="1">
+            <a:schemeClr val="accent1"/>
+          </a:effectRef>
+          <a:fontRef idx="minor">
+            <a:schemeClr val="tx1"/>
+          </a:fontRef>
+        </p:style>
+      </p:cxnSp>
+      <p:cxnSp>
+        <p:nvCxnSpPr>
+          <p:cNvPr id="112" name="Straight Arrow Connector 111"/>
+          <p:cNvCxnSpPr/>
+          <p:nvPr/>
+        </p:nvCxnSpPr>
+        <p:spPr>
+          <a:xfrm flipV="1">
+            <a:off x="11531503" y="1556123"/>
+            <a:ext cx="1511566" cy="16080"/>
+          </a:xfrm>
+          <a:prstGeom prst="straightConnector1">
+            <a:avLst/>
+          </a:prstGeom>
+          <a:ln w="57150" cmpd="sng">
+            <a:solidFill>
+              <a:schemeClr val="tx1"/>
+            </a:solidFill>
+            <a:tailEnd type="stealth" w="med" len="lg"/>
+          </a:ln>
+        </p:spPr>
+        <p:style>
+          <a:lnRef idx="2">
+            <a:schemeClr val="accent1"/>
+          </a:lnRef>
+          <a:fillRef idx="0">
+            <a:schemeClr val="accent1"/>
+          </a:fillRef>
+          <a:effectRef idx="1">
+            <a:schemeClr val="accent1"/>
+          </a:effectRef>
+          <a:fontRef idx="minor">
+            <a:schemeClr val="tx1"/>
+          </a:fontRef>
+        </p:style>
+      </p:cxnSp>
+      <p:cxnSp>
+        <p:nvCxnSpPr>
+          <p:cNvPr id="113" name="Straight Arrow Connector 112"/>
+          <p:cNvCxnSpPr/>
+          <p:nvPr/>
+        </p:nvCxnSpPr>
+        <p:spPr>
+          <a:xfrm flipV="1">
+            <a:off x="11540015" y="1281366"/>
+            <a:ext cx="1511566" cy="16080"/>
+          </a:xfrm>
+          <a:prstGeom prst="straightConnector1">
+            <a:avLst/>
+          </a:prstGeom>
+          <a:ln w="57150" cmpd="sng">
+            <a:solidFill>
+              <a:schemeClr val="tx1"/>
+            </a:solidFill>
+            <a:tailEnd type="stealth" w="med" len="lg"/>
+          </a:ln>
+        </p:spPr>
+        <p:style>
+          <a:lnRef idx="2">
+            <a:schemeClr val="accent1"/>
+          </a:lnRef>
+          <a:fillRef idx="0">
+            <a:schemeClr val="accent1"/>
+          </a:fillRef>
+          <a:effectRef idx="1">
+            <a:schemeClr val="accent1"/>
+          </a:effectRef>
+          <a:fontRef idx="minor">
+            <a:schemeClr val="tx1"/>
+          </a:fontRef>
+        </p:style>
+      </p:cxnSp>
+      <p:cxnSp>
+        <p:nvCxnSpPr>
+          <p:cNvPr id="114" name="Straight Arrow Connector 113"/>
+          <p:cNvCxnSpPr/>
+          <p:nvPr/>
+        </p:nvCxnSpPr>
+        <p:spPr>
+          <a:xfrm flipV="1">
+            <a:off x="11540015" y="968166"/>
+            <a:ext cx="1511566" cy="16080"/>
+          </a:xfrm>
+          <a:prstGeom prst="straightConnector1">
+            <a:avLst/>
+          </a:prstGeom>
+          <a:ln w="57150" cmpd="sng">
+            <a:solidFill>
+              <a:schemeClr val="tx1"/>
+            </a:solidFill>
+            <a:tailEnd type="stealth" w="med" len="lg"/>
+          </a:ln>
+        </p:spPr>
+        <p:style>
+          <a:lnRef idx="2">
+            <a:schemeClr val="accent1"/>
+          </a:lnRef>
+          <a:fillRef idx="0">
+            <a:schemeClr val="accent1"/>
+          </a:fillRef>
+          <a:effectRef idx="1">
+            <a:schemeClr val="accent1"/>
+          </a:effectRef>
+          <a:fontRef idx="minor">
+            <a:schemeClr val="tx1"/>
+          </a:fontRef>
+        </p:style>
+      </p:cxnSp>
+      <p:cxnSp>
+        <p:nvCxnSpPr>
+          <p:cNvPr id="115" name="Straight Arrow Connector 114"/>
+          <p:cNvCxnSpPr/>
+          <p:nvPr/>
+        </p:nvCxnSpPr>
+        <p:spPr>
+          <a:xfrm flipV="1">
+            <a:off x="11540015" y="681173"/>
+            <a:ext cx="1511566" cy="16080"/>
+          </a:xfrm>
+          <a:prstGeom prst="straightConnector1">
+            <a:avLst/>
+          </a:prstGeom>
+          <a:ln w="57150" cmpd="sng">
+            <a:solidFill>
+              <a:schemeClr val="tx1"/>
+            </a:solidFill>
+            <a:tailEnd type="stealth" w="med" len="lg"/>
+          </a:ln>
+        </p:spPr>
+        <p:style>
+          <a:lnRef idx="2">
+            <a:schemeClr val="accent1"/>
+          </a:lnRef>
+          <a:fillRef idx="0">
+            <a:schemeClr val="accent1"/>
+          </a:fillRef>
+          <a:effectRef idx="1">
+            <a:schemeClr val="accent1"/>
+          </a:effectRef>
+          <a:fontRef idx="minor">
+            <a:schemeClr val="tx1"/>
+          </a:fontRef>
+        </p:style>
+      </p:cxnSp>
+      <p:cxnSp>
+        <p:nvCxnSpPr>
+          <p:cNvPr id="116" name="Straight Arrow Connector 115"/>
+          <p:cNvCxnSpPr/>
+          <p:nvPr/>
+        </p:nvCxnSpPr>
+        <p:spPr>
+          <a:xfrm flipV="1">
+            <a:off x="11553825" y="400511"/>
+            <a:ext cx="1511566" cy="16080"/>
+          </a:xfrm>
+          <a:prstGeom prst="straightConnector1">
+            <a:avLst/>
+          </a:prstGeom>
+          <a:ln w="57150" cmpd="sng">
+            <a:solidFill>
+              <a:schemeClr val="tx1"/>
+            </a:solidFill>
+            <a:tailEnd type="stealth" w="med" len="lg"/>
+          </a:ln>
+        </p:spPr>
+        <p:style>
+          <a:lnRef idx="2">
+            <a:schemeClr val="accent1"/>
+          </a:lnRef>
+          <a:fillRef idx="0">
+            <a:schemeClr val="accent1"/>
+          </a:fillRef>
+          <a:effectRef idx="1">
+            <a:schemeClr val="accent1"/>
+          </a:effectRef>
+          <a:fontRef idx="minor">
+            <a:schemeClr val="tx1"/>
+          </a:fontRef>
+        </p:style>
+      </p:cxnSp>
+      <p:sp>
+        <p:nvSpPr>
+          <p:cNvPr id="27" name="TextBox 26"/>
+          <p:cNvSpPr txBox="1"/>
+          <p:nvPr/>
+        </p:nvSpPr>
+        <p:spPr>
+          <a:xfrm>
+            <a:off x="9791182" y="1666977"/>
+            <a:ext cx="2293050" cy="1077218"/>
+          </a:xfrm>
+          <a:prstGeom prst="rect">
+            <a:avLst/>
+          </a:prstGeom>
+          <a:noFill/>
+        </p:spPr>
+        <p:txBody>
+          <a:bodyPr wrap="square" rtlCol="0">
+            <a:spAutoFit/>
+          </a:bodyPr>
+          <a:lstStyle/>
+          <a:p>
+            <a:r>
+              <a:rPr lang="en-US" sz="3200" dirty="0" smtClean="0">
+                <a:latin typeface="Times"/>
+                <a:cs typeface="Times"/>
+              </a:rPr>
+              <a:t>Boundary Layer</a:t>
+            </a:r>
+            <a:endParaRPr lang="en-US" sz="3200" dirty="0">
+              <a:latin typeface="Times"/>
+              <a:cs typeface="Times"/>
+            </a:endParaRPr>
+          </a:p>
+        </p:txBody>
+      </p:sp>
+      <p:sp>
+        <p:nvSpPr>
+          <p:cNvPr id="117" name="TextBox 116"/>
+          <p:cNvSpPr txBox="1"/>
+          <p:nvPr/>
+        </p:nvSpPr>
+        <p:spPr>
+          <a:xfrm>
+            <a:off x="9791182" y="-127002"/>
+            <a:ext cx="2293050" cy="584776"/>
+          </a:xfrm>
+          <a:prstGeom prst="rect">
+            <a:avLst/>
+          </a:prstGeom>
+          <a:noFill/>
+        </p:spPr>
+        <p:txBody>
+          <a:bodyPr wrap="square" rtlCol="0">
+            <a:spAutoFit/>
+          </a:bodyPr>
+          <a:lstStyle/>
+          <a:p>
+            <a:r>
+              <a:rPr lang="en-US" sz="3200" dirty="0" smtClean="0">
+                <a:latin typeface="Times"/>
+                <a:cs typeface="Times"/>
+              </a:rPr>
+              <a:t>Free Flow</a:t>
+            </a:r>
+            <a:endParaRPr lang="en-US" sz="3200" dirty="0">
+              <a:latin typeface="Times"/>
+              <a:cs typeface="Times"/>
+            </a:endParaRPr>
+          </a:p>
+        </p:txBody>
+      </p:sp>
+      <p:sp>
+        <p:nvSpPr>
+          <p:cNvPr id="66" name="TextBox 65"/>
+          <p:cNvSpPr txBox="1"/>
+          <p:nvPr/>
+        </p:nvSpPr>
+        <p:spPr>
+          <a:xfrm>
+            <a:off x="1997660" y="3577957"/>
+            <a:ext cx="673199" cy="584776"/>
+          </a:xfrm>
+          <a:prstGeom prst="rect">
+            <a:avLst/>
+          </a:prstGeom>
+          <a:noFill/>
+        </p:spPr>
+        <p:txBody>
+          <a:bodyPr wrap="square" rtlCol="0">
+            <a:spAutoFit/>
+          </a:bodyPr>
+          <a:lstStyle/>
+          <a:p>
+            <a:r>
+              <a:rPr lang="en-US" sz="3200" b="1" dirty="0" smtClean="0">
+                <a:latin typeface="Times"/>
+                <a:cs typeface="Times"/>
+              </a:rPr>
+              <a:t>a.</a:t>
+            </a:r>
+            <a:endParaRPr lang="en-US" sz="3200" b="1" dirty="0">
+              <a:latin typeface="Times"/>
+              <a:cs typeface="Times"/>
+            </a:endParaRPr>
+          </a:p>
+        </p:txBody>
+      </p:sp>
+      <p:sp>
+        <p:nvSpPr>
+          <p:cNvPr id="118" name="TextBox 117"/>
+          <p:cNvSpPr txBox="1"/>
+          <p:nvPr/>
+        </p:nvSpPr>
+        <p:spPr>
+          <a:xfrm>
+            <a:off x="6804467" y="3577957"/>
+            <a:ext cx="673199" cy="584776"/>
+          </a:xfrm>
+          <a:prstGeom prst="rect">
+            <a:avLst/>
+          </a:prstGeom>
+          <a:noFill/>
+        </p:spPr>
+        <p:txBody>
+          <a:bodyPr wrap="square" rtlCol="0">
+            <a:spAutoFit/>
+          </a:bodyPr>
+          <a:lstStyle/>
+          <a:p>
+            <a:r>
+              <a:rPr lang="en-US" sz="3200" b="1" dirty="0">
+                <a:latin typeface="Times"/>
+                <a:cs typeface="Times"/>
+              </a:rPr>
+              <a:t>b</a:t>
+            </a:r>
+            <a:r>
+              <a:rPr lang="en-US" sz="3200" b="1" dirty="0" smtClean="0">
+                <a:latin typeface="Times"/>
+                <a:cs typeface="Times"/>
+              </a:rPr>
+              <a:t>.</a:t>
+            </a:r>
+            <a:endParaRPr lang="en-US" sz="3200" b="1" dirty="0">
+              <a:latin typeface="Times"/>
+              <a:cs typeface="Times"/>
+            </a:endParaRPr>
+          </a:p>
+        </p:txBody>
+      </p:sp>
+      <p:sp>
+        <p:nvSpPr>
+          <p:cNvPr id="119" name="TextBox 118"/>
+          <p:cNvSpPr txBox="1"/>
+          <p:nvPr/>
+        </p:nvSpPr>
+        <p:spPr>
+          <a:xfrm>
+            <a:off x="11513658" y="3593126"/>
+            <a:ext cx="673199" cy="584776"/>
+          </a:xfrm>
+          <a:prstGeom prst="rect">
+            <a:avLst/>
+          </a:prstGeom>
+          <a:noFill/>
+        </p:spPr>
+        <p:txBody>
+          <a:bodyPr wrap="square" rtlCol="0">
+            <a:spAutoFit/>
+          </a:bodyPr>
+          <a:lstStyle/>
+          <a:p>
+            <a:r>
+              <a:rPr lang="en-US" sz="3200" b="1" dirty="0">
+                <a:latin typeface="Times"/>
+                <a:cs typeface="Times"/>
+              </a:rPr>
+              <a:t>c</a:t>
+            </a:r>
+            <a:r>
+              <a:rPr lang="en-US" sz="3200" b="1" dirty="0" smtClean="0">
+                <a:latin typeface="Times"/>
+                <a:cs typeface="Times"/>
+              </a:rPr>
+              <a:t>.</a:t>
+            </a:r>
+            <a:endParaRPr lang="en-US" sz="3200" b="1" dirty="0">
+              <a:latin typeface="Times"/>
+              <a:cs typeface="Times"/>
+            </a:endParaRPr>
           </a:p>
         </p:txBody>
       </p:sp>

</xml_diff>

<commit_message>
Revert "Another size reducing"
This reverts commit 00170d29c67e47e6ba1dfe5c309b8fa7a25c70fc.
</commit_message>
<xml_diff>
--- a/RA-L/pictures/pdf/friction.pptx
+++ b/RA-L/pictures/pdf/friction.pptx
@@ -7,14 +7,14 @@
   <p:sldIdLst>
     <p:sldId id="256" r:id="rId2"/>
   </p:sldIdLst>
-  <p:sldSz cx="8229600" cy="2743200"/>
+  <p:sldSz cx="13716000" cy="4572000"/>
   <p:notesSz cx="6858000" cy="9144000"/>
   <p:defaultTextStyle>
     <a:defPPr>
       <a:defRPr lang="en-US"/>
     </a:defPPr>
-    <a:lvl1pPr marL="0" algn="l" defTabSz="188093" rtl="0" eaLnBrk="1" latinLnBrk="0" hangingPunct="1">
-      <a:defRPr sz="700" kern="1200">
+    <a:lvl1pPr marL="0" algn="l" defTabSz="313502" rtl="0" eaLnBrk="1" latinLnBrk="0" hangingPunct="1">
+      <a:defRPr sz="1200" kern="1200">
         <a:solidFill>
           <a:schemeClr val="tx1"/>
         </a:solidFill>
@@ -23,8 +23,8 @@
         <a:cs typeface="+mn-cs"/>
       </a:defRPr>
     </a:lvl1pPr>
-    <a:lvl2pPr marL="188093" algn="l" defTabSz="188093" rtl="0" eaLnBrk="1" latinLnBrk="0" hangingPunct="1">
-      <a:defRPr sz="700" kern="1200">
+    <a:lvl2pPr marL="313502" algn="l" defTabSz="313502" rtl="0" eaLnBrk="1" latinLnBrk="0" hangingPunct="1">
+      <a:defRPr sz="1200" kern="1200">
         <a:solidFill>
           <a:schemeClr val="tx1"/>
         </a:solidFill>
@@ -33,8 +33,8 @@
         <a:cs typeface="+mn-cs"/>
       </a:defRPr>
     </a:lvl2pPr>
-    <a:lvl3pPr marL="376187" algn="l" defTabSz="188093" rtl="0" eaLnBrk="1" latinLnBrk="0" hangingPunct="1">
-      <a:defRPr sz="700" kern="1200">
+    <a:lvl3pPr marL="627004" algn="l" defTabSz="313502" rtl="0" eaLnBrk="1" latinLnBrk="0" hangingPunct="1">
+      <a:defRPr sz="1200" kern="1200">
         <a:solidFill>
           <a:schemeClr val="tx1"/>
         </a:solidFill>
@@ -43,8 +43,8 @@
         <a:cs typeface="+mn-cs"/>
       </a:defRPr>
     </a:lvl3pPr>
-    <a:lvl4pPr marL="564281" algn="l" defTabSz="188093" rtl="0" eaLnBrk="1" latinLnBrk="0" hangingPunct="1">
-      <a:defRPr sz="700" kern="1200">
+    <a:lvl4pPr marL="940506" algn="l" defTabSz="313502" rtl="0" eaLnBrk="1" latinLnBrk="0" hangingPunct="1">
+      <a:defRPr sz="1200" kern="1200">
         <a:solidFill>
           <a:schemeClr val="tx1"/>
         </a:solidFill>
@@ -53,8 +53,8 @@
         <a:cs typeface="+mn-cs"/>
       </a:defRPr>
     </a:lvl4pPr>
-    <a:lvl5pPr marL="752375" algn="l" defTabSz="188093" rtl="0" eaLnBrk="1" latinLnBrk="0" hangingPunct="1">
-      <a:defRPr sz="700" kern="1200">
+    <a:lvl5pPr marL="1254008" algn="l" defTabSz="313502" rtl="0" eaLnBrk="1" latinLnBrk="0" hangingPunct="1">
+      <a:defRPr sz="1200" kern="1200">
         <a:solidFill>
           <a:schemeClr val="tx1"/>
         </a:solidFill>
@@ -63,8 +63,8 @@
         <a:cs typeface="+mn-cs"/>
       </a:defRPr>
     </a:lvl5pPr>
-    <a:lvl6pPr marL="940468" algn="l" defTabSz="188093" rtl="0" eaLnBrk="1" latinLnBrk="0" hangingPunct="1">
-      <a:defRPr sz="700" kern="1200">
+    <a:lvl6pPr marL="1567510" algn="l" defTabSz="313502" rtl="0" eaLnBrk="1" latinLnBrk="0" hangingPunct="1">
+      <a:defRPr sz="1200" kern="1200">
         <a:solidFill>
           <a:schemeClr val="tx1"/>
         </a:solidFill>
@@ -73,8 +73,8 @@
         <a:cs typeface="+mn-cs"/>
       </a:defRPr>
     </a:lvl6pPr>
-    <a:lvl7pPr marL="1128562" algn="l" defTabSz="188093" rtl="0" eaLnBrk="1" latinLnBrk="0" hangingPunct="1">
-      <a:defRPr sz="700" kern="1200">
+    <a:lvl7pPr marL="1881012" algn="l" defTabSz="313502" rtl="0" eaLnBrk="1" latinLnBrk="0" hangingPunct="1">
+      <a:defRPr sz="1200" kern="1200">
         <a:solidFill>
           <a:schemeClr val="tx1"/>
         </a:solidFill>
@@ -83,8 +83,8 @@
         <a:cs typeface="+mn-cs"/>
       </a:defRPr>
     </a:lvl7pPr>
-    <a:lvl8pPr marL="1316656" algn="l" defTabSz="188093" rtl="0" eaLnBrk="1" latinLnBrk="0" hangingPunct="1">
-      <a:defRPr sz="700" kern="1200">
+    <a:lvl8pPr marL="2194514" algn="l" defTabSz="313502" rtl="0" eaLnBrk="1" latinLnBrk="0" hangingPunct="1">
+      <a:defRPr sz="1200" kern="1200">
         <a:solidFill>
           <a:schemeClr val="tx1"/>
         </a:solidFill>
@@ -93,8 +93,8 @@
         <a:cs typeface="+mn-cs"/>
       </a:defRPr>
     </a:lvl8pPr>
-    <a:lvl9pPr marL="1504750" algn="l" defTabSz="188093" rtl="0" eaLnBrk="1" latinLnBrk="0" hangingPunct="1">
-      <a:defRPr sz="700" kern="1200">
+    <a:lvl9pPr marL="2508016" algn="l" defTabSz="313502" rtl="0" eaLnBrk="1" latinLnBrk="0" hangingPunct="1">
+      <a:defRPr sz="1200" kern="1200">
         <a:solidFill>
           <a:schemeClr val="tx1"/>
         </a:solidFill>
@@ -136,8 +136,8 @@
         </p:nvSpPr>
         <p:spPr>
           <a:xfrm>
-            <a:off x="617220" y="852171"/>
-            <a:ext cx="6995160" cy="588010"/>
+            <a:off x="1028700" y="1420284"/>
+            <a:ext cx="11658600" cy="980017"/>
           </a:xfrm>
         </p:spPr>
         <p:txBody>
@@ -164,8 +164,8 @@
         </p:nvSpPr>
         <p:spPr>
           <a:xfrm>
-            <a:off x="1234440" y="1554480"/>
-            <a:ext cx="5760720" cy="701040"/>
+            <a:off x="2057400" y="2590800"/>
+            <a:ext cx="9601200" cy="1168400"/>
           </a:xfrm>
         </p:spPr>
         <p:txBody>
@@ -181,7 +181,7 @@
                 </a:solidFill>
               </a:defRPr>
             </a:lvl1pPr>
-            <a:lvl2pPr marL="188093" indent="0" algn="ctr">
+            <a:lvl2pPr marL="313502" indent="0" algn="ctr">
               <a:buNone/>
               <a:defRPr>
                 <a:solidFill>
@@ -191,7 +191,7 @@
                 </a:solidFill>
               </a:defRPr>
             </a:lvl2pPr>
-            <a:lvl3pPr marL="376187" indent="0" algn="ctr">
+            <a:lvl3pPr marL="627004" indent="0" algn="ctr">
               <a:buNone/>
               <a:defRPr>
                 <a:solidFill>
@@ -201,7 +201,7 @@
                 </a:solidFill>
               </a:defRPr>
             </a:lvl3pPr>
-            <a:lvl4pPr marL="564281" indent="0" algn="ctr">
+            <a:lvl4pPr marL="940506" indent="0" algn="ctr">
               <a:buNone/>
               <a:defRPr>
                 <a:solidFill>
@@ -211,7 +211,7 @@
                 </a:solidFill>
               </a:defRPr>
             </a:lvl4pPr>
-            <a:lvl5pPr marL="752375" indent="0" algn="ctr">
+            <a:lvl5pPr marL="1254008" indent="0" algn="ctr">
               <a:buNone/>
               <a:defRPr>
                 <a:solidFill>
@@ -221,7 +221,7 @@
                 </a:solidFill>
               </a:defRPr>
             </a:lvl5pPr>
-            <a:lvl6pPr marL="940468" indent="0" algn="ctr">
+            <a:lvl6pPr marL="1567510" indent="0" algn="ctr">
               <a:buNone/>
               <a:defRPr>
                 <a:solidFill>
@@ -231,7 +231,7 @@
                 </a:solidFill>
               </a:defRPr>
             </a:lvl6pPr>
-            <a:lvl7pPr marL="1128562" indent="0" algn="ctr">
+            <a:lvl7pPr marL="1881012" indent="0" algn="ctr">
               <a:buNone/>
               <a:defRPr>
                 <a:solidFill>
@@ -241,7 +241,7 @@
                 </a:solidFill>
               </a:defRPr>
             </a:lvl7pPr>
-            <a:lvl8pPr marL="1316656" indent="0" algn="ctr">
+            <a:lvl8pPr marL="2194514" indent="0" algn="ctr">
               <a:buNone/>
               <a:defRPr>
                 <a:solidFill>
@@ -251,7 +251,7 @@
                 </a:solidFill>
               </a:defRPr>
             </a:lvl8pPr>
-            <a:lvl9pPr marL="1504750" indent="0" algn="ctr">
+            <a:lvl9pPr marL="2508016" indent="0" algn="ctr">
               <a:buNone/>
               <a:defRPr>
                 <a:solidFill>
@@ -288,7 +288,7 @@
           <a:p>
             <a:fld id="{6666019B-6789-7642-8563-2C9E17E98A28}" type="datetimeFigureOut">
               <a:rPr lang="en-US" smtClean="0"/>
-              <a:t>9/5/16</a:t>
+              <a:t>9/10/16</a:t>
             </a:fld>
             <a:endParaRPr lang="en-US"/>
           </a:p>
@@ -458,7 +458,7 @@
           <a:p>
             <a:fld id="{6666019B-6789-7642-8563-2C9E17E98A28}" type="datetimeFigureOut">
               <a:rPr lang="en-US" smtClean="0"/>
-              <a:t>9/5/16</a:t>
+              <a:t>9/10/16</a:t>
             </a:fld>
             <a:endParaRPr lang="en-US"/>
           </a:p>
@@ -548,8 +548,8 @@
         </p:nvSpPr>
         <p:spPr>
           <a:xfrm>
-            <a:off x="4176238" y="73027"/>
-            <a:ext cx="1295875" cy="1560830"/>
+            <a:off x="6960397" y="121712"/>
+            <a:ext cx="2159792" cy="2601383"/>
           </a:xfrm>
         </p:spPr>
         <p:txBody>
@@ -576,8 +576,8 @@
         </p:nvSpPr>
         <p:spPr>
           <a:xfrm>
-            <a:off x="288607" y="73027"/>
-            <a:ext cx="3750470" cy="1560830"/>
+            <a:off x="481012" y="121712"/>
+            <a:ext cx="6250784" cy="2601383"/>
           </a:xfrm>
         </p:spPr>
         <p:txBody>
@@ -638,7 +638,7 @@
           <a:p>
             <a:fld id="{6666019B-6789-7642-8563-2C9E17E98A28}" type="datetimeFigureOut">
               <a:rPr lang="en-US" smtClean="0"/>
-              <a:t>9/5/16</a:t>
+              <a:t>9/10/16</a:t>
             </a:fld>
             <a:endParaRPr lang="en-US"/>
           </a:p>
@@ -808,7 +808,7 @@
           <a:p>
             <a:fld id="{6666019B-6789-7642-8563-2C9E17E98A28}" type="datetimeFigureOut">
               <a:rPr lang="en-US" smtClean="0"/>
-              <a:t>9/5/16</a:t>
+              <a:t>9/10/16</a:t>
             </a:fld>
             <a:endParaRPr lang="en-US"/>
           </a:p>
@@ -898,15 +898,15 @@
         </p:nvSpPr>
         <p:spPr>
           <a:xfrm>
-            <a:off x="650082" y="1762760"/>
-            <a:ext cx="6995160" cy="544830"/>
+            <a:off x="1083470" y="2937934"/>
+            <a:ext cx="11658600" cy="908050"/>
           </a:xfrm>
         </p:spPr>
         <p:txBody>
           <a:bodyPr anchor="t"/>
           <a:lstStyle>
             <a:lvl1pPr algn="l">
-              <a:defRPr sz="1600" b="1" cap="all"/>
+              <a:defRPr sz="2700" b="1" cap="all"/>
             </a:lvl1pPr>
           </a:lstStyle>
           <a:p>
@@ -930,8 +930,8 @@
         </p:nvSpPr>
         <p:spPr>
           <a:xfrm>
-            <a:off x="650082" y="1162689"/>
-            <a:ext cx="6995160" cy="600075"/>
+            <a:off x="1083470" y="1937812"/>
+            <a:ext cx="11658600" cy="1000125"/>
           </a:xfrm>
         </p:spPr>
         <p:txBody>
@@ -939,7 +939,7 @@
           <a:lstStyle>
             <a:lvl1pPr marL="0" indent="0">
               <a:buNone/>
-              <a:defRPr sz="800">
+              <a:defRPr sz="1400">
                 <a:solidFill>
                   <a:schemeClr val="tx1">
                     <a:tint val="75000"/>
@@ -947,9 +947,9 @@
                 </a:solidFill>
               </a:defRPr>
             </a:lvl1pPr>
-            <a:lvl2pPr marL="188093" indent="0">
-              <a:buNone/>
-              <a:defRPr sz="700">
+            <a:lvl2pPr marL="313502" indent="0">
+              <a:buNone/>
+              <a:defRPr sz="1200">
                 <a:solidFill>
                   <a:schemeClr val="tx1">
                     <a:tint val="75000"/>
@@ -957,9 +957,9 @@
                 </a:solidFill>
               </a:defRPr>
             </a:lvl2pPr>
-            <a:lvl3pPr marL="376187" indent="0">
-              <a:buNone/>
-              <a:defRPr sz="700">
+            <a:lvl3pPr marL="627004" indent="0">
+              <a:buNone/>
+              <a:defRPr sz="1100">
                 <a:solidFill>
                   <a:schemeClr val="tx1">
                     <a:tint val="75000"/>
@@ -967,9 +967,9 @@
                 </a:solidFill>
               </a:defRPr>
             </a:lvl3pPr>
-            <a:lvl4pPr marL="564281" indent="0">
-              <a:buNone/>
-              <a:defRPr sz="600">
+            <a:lvl4pPr marL="940506" indent="0">
+              <a:buNone/>
+              <a:defRPr sz="1000">
                 <a:solidFill>
                   <a:schemeClr val="tx1">
                     <a:tint val="75000"/>
@@ -977,9 +977,9 @@
                 </a:solidFill>
               </a:defRPr>
             </a:lvl4pPr>
-            <a:lvl5pPr marL="752375" indent="0">
-              <a:buNone/>
-              <a:defRPr sz="600">
+            <a:lvl5pPr marL="1254008" indent="0">
+              <a:buNone/>
+              <a:defRPr sz="1000">
                 <a:solidFill>
                   <a:schemeClr val="tx1">
                     <a:tint val="75000"/>
@@ -987,9 +987,9 @@
                 </a:solidFill>
               </a:defRPr>
             </a:lvl5pPr>
-            <a:lvl6pPr marL="940468" indent="0">
-              <a:buNone/>
-              <a:defRPr sz="600">
+            <a:lvl6pPr marL="1567510" indent="0">
+              <a:buNone/>
+              <a:defRPr sz="1000">
                 <a:solidFill>
                   <a:schemeClr val="tx1">
                     <a:tint val="75000"/>
@@ -997,9 +997,9 @@
                 </a:solidFill>
               </a:defRPr>
             </a:lvl6pPr>
-            <a:lvl7pPr marL="1128562" indent="0">
-              <a:buNone/>
-              <a:defRPr sz="600">
+            <a:lvl7pPr marL="1881012" indent="0">
+              <a:buNone/>
+              <a:defRPr sz="1000">
                 <a:solidFill>
                   <a:schemeClr val="tx1">
                     <a:tint val="75000"/>
@@ -1007,9 +1007,9 @@
                 </a:solidFill>
               </a:defRPr>
             </a:lvl7pPr>
-            <a:lvl8pPr marL="1316656" indent="0">
-              <a:buNone/>
-              <a:defRPr sz="600">
+            <a:lvl8pPr marL="2194514" indent="0">
+              <a:buNone/>
+              <a:defRPr sz="1000">
                 <a:solidFill>
                   <a:schemeClr val="tx1">
                     <a:tint val="75000"/>
@@ -1017,9 +1017,9 @@
                 </a:solidFill>
               </a:defRPr>
             </a:lvl8pPr>
-            <a:lvl9pPr marL="1504750" indent="0">
-              <a:buNone/>
-              <a:defRPr sz="600">
+            <a:lvl9pPr marL="2508016" indent="0">
+              <a:buNone/>
+              <a:defRPr sz="1000">
                 <a:solidFill>
                   <a:schemeClr val="tx1">
                     <a:tint val="75000"/>
@@ -1054,7 +1054,7 @@
           <a:p>
             <a:fld id="{6666019B-6789-7642-8563-2C9E17E98A28}" type="datetimeFigureOut">
               <a:rPr lang="en-US" smtClean="0"/>
-              <a:t>9/5/16</a:t>
+              <a:t>9/10/16</a:t>
             </a:fld>
             <a:endParaRPr lang="en-US"/>
           </a:p>
@@ -1167,39 +1167,39 @@
         </p:nvSpPr>
         <p:spPr>
           <a:xfrm>
-            <a:off x="288610" y="426721"/>
-            <a:ext cx="2523173" cy="1207135"/>
+            <a:off x="481014" y="711200"/>
+            <a:ext cx="4205289" cy="2011892"/>
           </a:xfrm>
         </p:spPr>
         <p:txBody>
           <a:bodyPr/>
           <a:lstStyle>
             <a:lvl1pPr>
-              <a:defRPr sz="1100"/>
+              <a:defRPr sz="1900"/>
             </a:lvl1pPr>
             <a:lvl2pPr>
-              <a:defRPr sz="1000"/>
+              <a:defRPr sz="1600"/>
             </a:lvl2pPr>
             <a:lvl3pPr>
-              <a:defRPr sz="800"/>
+              <a:defRPr sz="1400"/>
             </a:lvl3pPr>
             <a:lvl4pPr>
-              <a:defRPr sz="700"/>
+              <a:defRPr sz="1200"/>
             </a:lvl4pPr>
             <a:lvl5pPr>
-              <a:defRPr sz="700"/>
+              <a:defRPr sz="1200"/>
             </a:lvl5pPr>
             <a:lvl6pPr>
-              <a:defRPr sz="700"/>
+              <a:defRPr sz="1200"/>
             </a:lvl6pPr>
             <a:lvl7pPr>
-              <a:defRPr sz="700"/>
+              <a:defRPr sz="1200"/>
             </a:lvl7pPr>
             <a:lvl8pPr>
-              <a:defRPr sz="700"/>
+              <a:defRPr sz="1200"/>
             </a:lvl8pPr>
             <a:lvl9pPr>
-              <a:defRPr sz="700"/>
+              <a:defRPr sz="1200"/>
             </a:lvl9pPr>
           </a:lstStyle>
           <a:p>
@@ -1252,39 +1252,39 @@
         </p:nvSpPr>
         <p:spPr>
           <a:xfrm>
-            <a:off x="2948942" y="426721"/>
-            <a:ext cx="2523173" cy="1207135"/>
+            <a:off x="4914900" y="711200"/>
+            <a:ext cx="4205289" cy="2011892"/>
           </a:xfrm>
         </p:spPr>
         <p:txBody>
           <a:bodyPr/>
           <a:lstStyle>
             <a:lvl1pPr>
-              <a:defRPr sz="1100"/>
+              <a:defRPr sz="1900"/>
             </a:lvl1pPr>
             <a:lvl2pPr>
-              <a:defRPr sz="1000"/>
+              <a:defRPr sz="1600"/>
             </a:lvl2pPr>
             <a:lvl3pPr>
-              <a:defRPr sz="800"/>
+              <a:defRPr sz="1400"/>
             </a:lvl3pPr>
             <a:lvl4pPr>
-              <a:defRPr sz="700"/>
+              <a:defRPr sz="1200"/>
             </a:lvl4pPr>
             <a:lvl5pPr>
-              <a:defRPr sz="700"/>
+              <a:defRPr sz="1200"/>
             </a:lvl5pPr>
             <a:lvl6pPr>
-              <a:defRPr sz="700"/>
+              <a:defRPr sz="1200"/>
             </a:lvl6pPr>
             <a:lvl7pPr>
-              <a:defRPr sz="700"/>
+              <a:defRPr sz="1200"/>
             </a:lvl7pPr>
             <a:lvl8pPr>
-              <a:defRPr sz="700"/>
+              <a:defRPr sz="1200"/>
             </a:lvl8pPr>
             <a:lvl9pPr>
-              <a:defRPr sz="700"/>
+              <a:defRPr sz="1200"/>
             </a:lvl9pPr>
           </a:lstStyle>
           <a:p>
@@ -1342,7 +1342,7 @@
           <a:p>
             <a:fld id="{6666019B-6789-7642-8563-2C9E17E98A28}" type="datetimeFigureOut">
               <a:rPr lang="en-US" smtClean="0"/>
-              <a:t>9/5/16</a:t>
+              <a:t>9/10/16</a:t>
             </a:fld>
             <a:endParaRPr lang="en-US"/>
           </a:p>
@@ -1432,8 +1432,8 @@
         </p:nvSpPr>
         <p:spPr>
           <a:xfrm>
-            <a:off x="411480" y="109855"/>
-            <a:ext cx="7406640" cy="457200"/>
+            <a:off x="685800" y="183092"/>
+            <a:ext cx="12344400" cy="762000"/>
           </a:xfrm>
         </p:spPr>
         <p:txBody>
@@ -1464,8 +1464,8 @@
         </p:nvSpPr>
         <p:spPr>
           <a:xfrm>
-            <a:off x="411481" y="614045"/>
-            <a:ext cx="3636170" cy="255905"/>
+            <a:off x="685801" y="1023409"/>
+            <a:ext cx="6060284" cy="426508"/>
           </a:xfrm>
         </p:spPr>
         <p:txBody>
@@ -1473,39 +1473,39 @@
           <a:lstStyle>
             <a:lvl1pPr marL="0" indent="0">
               <a:buNone/>
-              <a:defRPr sz="1000" b="1"/>
+              <a:defRPr sz="1600" b="1"/>
             </a:lvl1pPr>
-            <a:lvl2pPr marL="188093" indent="0">
-              <a:buNone/>
-              <a:defRPr sz="800" b="1"/>
+            <a:lvl2pPr marL="313502" indent="0">
+              <a:buNone/>
+              <a:defRPr sz="1400" b="1"/>
             </a:lvl2pPr>
-            <a:lvl3pPr marL="376187" indent="0">
-              <a:buNone/>
-              <a:defRPr sz="700" b="1"/>
+            <a:lvl3pPr marL="627004" indent="0">
+              <a:buNone/>
+              <a:defRPr sz="1200" b="1"/>
             </a:lvl3pPr>
-            <a:lvl4pPr marL="564281" indent="0">
-              <a:buNone/>
-              <a:defRPr sz="700" b="1"/>
+            <a:lvl4pPr marL="940506" indent="0">
+              <a:buNone/>
+              <a:defRPr sz="1100" b="1"/>
             </a:lvl4pPr>
-            <a:lvl5pPr marL="752375" indent="0">
-              <a:buNone/>
-              <a:defRPr sz="700" b="1"/>
+            <a:lvl5pPr marL="1254008" indent="0">
+              <a:buNone/>
+              <a:defRPr sz="1100" b="1"/>
             </a:lvl5pPr>
-            <a:lvl6pPr marL="940468" indent="0">
-              <a:buNone/>
-              <a:defRPr sz="700" b="1"/>
+            <a:lvl6pPr marL="1567510" indent="0">
+              <a:buNone/>
+              <a:defRPr sz="1100" b="1"/>
             </a:lvl6pPr>
-            <a:lvl7pPr marL="1128562" indent="0">
-              <a:buNone/>
-              <a:defRPr sz="700" b="1"/>
+            <a:lvl7pPr marL="1881012" indent="0">
+              <a:buNone/>
+              <a:defRPr sz="1100" b="1"/>
             </a:lvl7pPr>
-            <a:lvl8pPr marL="1316656" indent="0">
-              <a:buNone/>
-              <a:defRPr sz="700" b="1"/>
+            <a:lvl8pPr marL="2194514" indent="0">
+              <a:buNone/>
+              <a:defRPr sz="1100" b="1"/>
             </a:lvl8pPr>
-            <a:lvl9pPr marL="1504750" indent="0">
-              <a:buNone/>
-              <a:defRPr sz="700" b="1"/>
+            <a:lvl9pPr marL="2508016" indent="0">
+              <a:buNone/>
+              <a:defRPr sz="1100" b="1"/>
             </a:lvl9pPr>
           </a:lstStyle>
           <a:p>
@@ -1529,39 +1529,39 @@
         </p:nvSpPr>
         <p:spPr>
           <a:xfrm>
-            <a:off x="411481" y="869950"/>
-            <a:ext cx="3636170" cy="1580515"/>
+            <a:off x="685801" y="1449917"/>
+            <a:ext cx="6060284" cy="2634192"/>
           </a:xfrm>
         </p:spPr>
         <p:txBody>
           <a:bodyPr/>
           <a:lstStyle>
             <a:lvl1pPr>
-              <a:defRPr sz="1000"/>
+              <a:defRPr sz="1600"/>
             </a:lvl1pPr>
             <a:lvl2pPr>
-              <a:defRPr sz="800"/>
+              <a:defRPr sz="1400"/>
             </a:lvl2pPr>
             <a:lvl3pPr>
-              <a:defRPr sz="700"/>
+              <a:defRPr sz="1200"/>
             </a:lvl3pPr>
             <a:lvl4pPr>
-              <a:defRPr sz="700"/>
+              <a:defRPr sz="1100"/>
             </a:lvl4pPr>
             <a:lvl5pPr>
-              <a:defRPr sz="700"/>
+              <a:defRPr sz="1100"/>
             </a:lvl5pPr>
             <a:lvl6pPr>
-              <a:defRPr sz="700"/>
+              <a:defRPr sz="1100"/>
             </a:lvl6pPr>
             <a:lvl7pPr>
-              <a:defRPr sz="700"/>
+              <a:defRPr sz="1100"/>
             </a:lvl7pPr>
             <a:lvl8pPr>
-              <a:defRPr sz="700"/>
+              <a:defRPr sz="1100"/>
             </a:lvl8pPr>
             <a:lvl9pPr>
-              <a:defRPr sz="700"/>
+              <a:defRPr sz="1100"/>
             </a:lvl9pPr>
           </a:lstStyle>
           <a:p>
@@ -1614,8 +1614,8 @@
         </p:nvSpPr>
         <p:spPr>
           <a:xfrm>
-            <a:off x="4180524" y="614045"/>
-            <a:ext cx="3637598" cy="255905"/>
+            <a:off x="6967539" y="1023409"/>
+            <a:ext cx="6062664" cy="426508"/>
           </a:xfrm>
         </p:spPr>
         <p:txBody>
@@ -1623,39 +1623,39 @@
           <a:lstStyle>
             <a:lvl1pPr marL="0" indent="0">
               <a:buNone/>
-              <a:defRPr sz="1000" b="1"/>
+              <a:defRPr sz="1600" b="1"/>
             </a:lvl1pPr>
-            <a:lvl2pPr marL="188093" indent="0">
-              <a:buNone/>
-              <a:defRPr sz="800" b="1"/>
+            <a:lvl2pPr marL="313502" indent="0">
+              <a:buNone/>
+              <a:defRPr sz="1400" b="1"/>
             </a:lvl2pPr>
-            <a:lvl3pPr marL="376187" indent="0">
-              <a:buNone/>
-              <a:defRPr sz="700" b="1"/>
+            <a:lvl3pPr marL="627004" indent="0">
+              <a:buNone/>
+              <a:defRPr sz="1200" b="1"/>
             </a:lvl3pPr>
-            <a:lvl4pPr marL="564281" indent="0">
-              <a:buNone/>
-              <a:defRPr sz="700" b="1"/>
+            <a:lvl4pPr marL="940506" indent="0">
+              <a:buNone/>
+              <a:defRPr sz="1100" b="1"/>
             </a:lvl4pPr>
-            <a:lvl5pPr marL="752375" indent="0">
-              <a:buNone/>
-              <a:defRPr sz="700" b="1"/>
+            <a:lvl5pPr marL="1254008" indent="0">
+              <a:buNone/>
+              <a:defRPr sz="1100" b="1"/>
             </a:lvl5pPr>
-            <a:lvl6pPr marL="940468" indent="0">
-              <a:buNone/>
-              <a:defRPr sz="700" b="1"/>
+            <a:lvl6pPr marL="1567510" indent="0">
+              <a:buNone/>
+              <a:defRPr sz="1100" b="1"/>
             </a:lvl6pPr>
-            <a:lvl7pPr marL="1128562" indent="0">
-              <a:buNone/>
-              <a:defRPr sz="700" b="1"/>
+            <a:lvl7pPr marL="1881012" indent="0">
+              <a:buNone/>
+              <a:defRPr sz="1100" b="1"/>
             </a:lvl7pPr>
-            <a:lvl8pPr marL="1316656" indent="0">
-              <a:buNone/>
-              <a:defRPr sz="700" b="1"/>
+            <a:lvl8pPr marL="2194514" indent="0">
+              <a:buNone/>
+              <a:defRPr sz="1100" b="1"/>
             </a:lvl8pPr>
-            <a:lvl9pPr marL="1504750" indent="0">
-              <a:buNone/>
-              <a:defRPr sz="700" b="1"/>
+            <a:lvl9pPr marL="2508016" indent="0">
+              <a:buNone/>
+              <a:defRPr sz="1100" b="1"/>
             </a:lvl9pPr>
           </a:lstStyle>
           <a:p>
@@ -1679,39 +1679,39 @@
         </p:nvSpPr>
         <p:spPr>
           <a:xfrm>
-            <a:off x="4180524" y="869950"/>
-            <a:ext cx="3637598" cy="1580515"/>
+            <a:off x="6967539" y="1449917"/>
+            <a:ext cx="6062664" cy="2634192"/>
           </a:xfrm>
         </p:spPr>
         <p:txBody>
           <a:bodyPr/>
           <a:lstStyle>
             <a:lvl1pPr>
-              <a:defRPr sz="1000"/>
+              <a:defRPr sz="1600"/>
             </a:lvl1pPr>
             <a:lvl2pPr>
-              <a:defRPr sz="800"/>
+              <a:defRPr sz="1400"/>
             </a:lvl2pPr>
             <a:lvl3pPr>
-              <a:defRPr sz="700"/>
+              <a:defRPr sz="1200"/>
             </a:lvl3pPr>
             <a:lvl4pPr>
-              <a:defRPr sz="700"/>
+              <a:defRPr sz="1100"/>
             </a:lvl4pPr>
             <a:lvl5pPr>
-              <a:defRPr sz="700"/>
+              <a:defRPr sz="1100"/>
             </a:lvl5pPr>
             <a:lvl6pPr>
-              <a:defRPr sz="700"/>
+              <a:defRPr sz="1100"/>
             </a:lvl6pPr>
             <a:lvl7pPr>
-              <a:defRPr sz="700"/>
+              <a:defRPr sz="1100"/>
             </a:lvl7pPr>
             <a:lvl8pPr>
-              <a:defRPr sz="700"/>
+              <a:defRPr sz="1100"/>
             </a:lvl8pPr>
             <a:lvl9pPr>
-              <a:defRPr sz="700"/>
+              <a:defRPr sz="1100"/>
             </a:lvl9pPr>
           </a:lstStyle>
           <a:p>
@@ -1769,7 +1769,7 @@
           <a:p>
             <a:fld id="{6666019B-6789-7642-8563-2C9E17E98A28}" type="datetimeFigureOut">
               <a:rPr lang="en-US" smtClean="0"/>
-              <a:t>9/5/16</a:t>
+              <a:t>9/10/16</a:t>
             </a:fld>
             <a:endParaRPr lang="en-US"/>
           </a:p>
@@ -1887,7 +1887,7 @@
           <a:p>
             <a:fld id="{6666019B-6789-7642-8563-2C9E17E98A28}" type="datetimeFigureOut">
               <a:rPr lang="en-US" smtClean="0"/>
-              <a:t>9/5/16</a:t>
+              <a:t>9/10/16</a:t>
             </a:fld>
             <a:endParaRPr lang="en-US"/>
           </a:p>
@@ -1982,7 +1982,7 @@
           <a:p>
             <a:fld id="{6666019B-6789-7642-8563-2C9E17E98A28}" type="datetimeFigureOut">
               <a:rPr lang="en-US" smtClean="0"/>
-              <a:t>9/5/16</a:t>
+              <a:t>9/10/16</a:t>
             </a:fld>
             <a:endParaRPr lang="en-US"/>
           </a:p>
@@ -2072,15 +2072,15 @@
         </p:nvSpPr>
         <p:spPr>
           <a:xfrm>
-            <a:off x="411481" y="109220"/>
-            <a:ext cx="2707482" cy="464820"/>
+            <a:off x="685801" y="182033"/>
+            <a:ext cx="4512470" cy="774700"/>
           </a:xfrm>
         </p:spPr>
         <p:txBody>
           <a:bodyPr anchor="b"/>
           <a:lstStyle>
             <a:lvl1pPr algn="l">
-              <a:defRPr sz="800" b="1"/>
+              <a:defRPr sz="1400" b="1"/>
             </a:lvl1pPr>
           </a:lstStyle>
           <a:p>
@@ -2104,39 +2104,39 @@
         </p:nvSpPr>
         <p:spPr>
           <a:xfrm>
-            <a:off x="3217548" y="109224"/>
-            <a:ext cx="4600575" cy="2341245"/>
+            <a:off x="5362578" y="182037"/>
+            <a:ext cx="7667625" cy="3902075"/>
           </a:xfrm>
         </p:spPr>
         <p:txBody>
           <a:bodyPr/>
           <a:lstStyle>
             <a:lvl1pPr>
-              <a:defRPr sz="1300"/>
+              <a:defRPr sz="2200"/>
             </a:lvl1pPr>
             <a:lvl2pPr>
-              <a:defRPr sz="1100"/>
+              <a:defRPr sz="1900"/>
             </a:lvl2pPr>
             <a:lvl3pPr>
-              <a:defRPr sz="1000"/>
+              <a:defRPr sz="1600"/>
             </a:lvl3pPr>
             <a:lvl4pPr>
-              <a:defRPr sz="800"/>
+              <a:defRPr sz="1400"/>
             </a:lvl4pPr>
             <a:lvl5pPr>
-              <a:defRPr sz="800"/>
+              <a:defRPr sz="1400"/>
             </a:lvl5pPr>
             <a:lvl6pPr>
-              <a:defRPr sz="800"/>
+              <a:defRPr sz="1400"/>
             </a:lvl6pPr>
             <a:lvl7pPr>
-              <a:defRPr sz="800"/>
+              <a:defRPr sz="1400"/>
             </a:lvl7pPr>
             <a:lvl8pPr>
-              <a:defRPr sz="800"/>
+              <a:defRPr sz="1400"/>
             </a:lvl8pPr>
             <a:lvl9pPr>
-              <a:defRPr sz="800"/>
+              <a:defRPr sz="1400"/>
             </a:lvl9pPr>
           </a:lstStyle>
           <a:p>
@@ -2189,8 +2189,8 @@
         </p:nvSpPr>
         <p:spPr>
           <a:xfrm>
-            <a:off x="411481" y="574044"/>
-            <a:ext cx="2707482" cy="1876425"/>
+            <a:off x="685801" y="956737"/>
+            <a:ext cx="4512470" cy="3127375"/>
           </a:xfrm>
         </p:spPr>
         <p:txBody>
@@ -2198,39 +2198,39 @@
           <a:lstStyle>
             <a:lvl1pPr marL="0" indent="0">
               <a:buNone/>
+              <a:defRPr sz="1000"/>
+            </a:lvl1pPr>
+            <a:lvl2pPr marL="313502" indent="0">
+              <a:buNone/>
+              <a:defRPr sz="800"/>
+            </a:lvl2pPr>
+            <a:lvl3pPr marL="627004" indent="0">
+              <a:buNone/>
+              <a:defRPr sz="700"/>
+            </a:lvl3pPr>
+            <a:lvl4pPr marL="940506" indent="0">
+              <a:buNone/>
               <a:defRPr sz="600"/>
-            </a:lvl1pPr>
-            <a:lvl2pPr marL="188093" indent="0">
-              <a:buNone/>
-              <a:defRPr sz="500"/>
-            </a:lvl2pPr>
-            <a:lvl3pPr marL="376187" indent="0">
-              <a:buNone/>
-              <a:defRPr sz="400"/>
-            </a:lvl3pPr>
-            <a:lvl4pPr marL="564281" indent="0">
-              <a:buNone/>
-              <a:defRPr sz="400"/>
             </a:lvl4pPr>
-            <a:lvl5pPr marL="752375" indent="0">
-              <a:buNone/>
-              <a:defRPr sz="400"/>
+            <a:lvl5pPr marL="1254008" indent="0">
+              <a:buNone/>
+              <a:defRPr sz="600"/>
             </a:lvl5pPr>
-            <a:lvl6pPr marL="940468" indent="0">
-              <a:buNone/>
-              <a:defRPr sz="400"/>
+            <a:lvl6pPr marL="1567510" indent="0">
+              <a:buNone/>
+              <a:defRPr sz="600"/>
             </a:lvl6pPr>
-            <a:lvl7pPr marL="1128562" indent="0">
-              <a:buNone/>
-              <a:defRPr sz="400"/>
+            <a:lvl7pPr marL="1881012" indent="0">
+              <a:buNone/>
+              <a:defRPr sz="600"/>
             </a:lvl7pPr>
-            <a:lvl8pPr marL="1316656" indent="0">
-              <a:buNone/>
-              <a:defRPr sz="400"/>
+            <a:lvl8pPr marL="2194514" indent="0">
+              <a:buNone/>
+              <a:defRPr sz="600"/>
             </a:lvl8pPr>
-            <a:lvl9pPr marL="1504750" indent="0">
-              <a:buNone/>
-              <a:defRPr sz="400"/>
+            <a:lvl9pPr marL="2508016" indent="0">
+              <a:buNone/>
+              <a:defRPr sz="600"/>
             </a:lvl9pPr>
           </a:lstStyle>
           <a:p>
@@ -2259,7 +2259,7 @@
           <a:p>
             <a:fld id="{6666019B-6789-7642-8563-2C9E17E98A28}" type="datetimeFigureOut">
               <a:rPr lang="en-US" smtClean="0"/>
-              <a:t>9/5/16</a:t>
+              <a:t>9/10/16</a:t>
             </a:fld>
             <a:endParaRPr lang="en-US"/>
           </a:p>
@@ -2349,15 +2349,15 @@
         </p:nvSpPr>
         <p:spPr>
           <a:xfrm>
-            <a:off x="1613060" y="1920243"/>
-            <a:ext cx="4937760" cy="226695"/>
+            <a:off x="2688434" y="3200403"/>
+            <a:ext cx="8229600" cy="377825"/>
           </a:xfrm>
         </p:spPr>
         <p:txBody>
           <a:bodyPr anchor="b"/>
           <a:lstStyle>
             <a:lvl1pPr algn="l">
-              <a:defRPr sz="800" b="1"/>
+              <a:defRPr sz="1400" b="1"/>
             </a:lvl1pPr>
           </a:lstStyle>
           <a:p>
@@ -2381,8 +2381,8 @@
         </p:nvSpPr>
         <p:spPr>
           <a:xfrm>
-            <a:off x="1613060" y="245110"/>
-            <a:ext cx="4937760" cy="1645920"/>
+            <a:off x="2688434" y="408517"/>
+            <a:ext cx="8229600" cy="2743200"/>
           </a:xfrm>
         </p:spPr>
         <p:txBody>
@@ -2390,39 +2390,39 @@
           <a:lstStyle>
             <a:lvl1pPr marL="0" indent="0">
               <a:buNone/>
-              <a:defRPr sz="1300"/>
+              <a:defRPr sz="2200"/>
             </a:lvl1pPr>
-            <a:lvl2pPr marL="188093" indent="0">
-              <a:buNone/>
-              <a:defRPr sz="1100"/>
+            <a:lvl2pPr marL="313502" indent="0">
+              <a:buNone/>
+              <a:defRPr sz="1900"/>
             </a:lvl2pPr>
-            <a:lvl3pPr marL="376187" indent="0">
-              <a:buNone/>
-              <a:defRPr sz="1000"/>
+            <a:lvl3pPr marL="627004" indent="0">
+              <a:buNone/>
+              <a:defRPr sz="1600"/>
             </a:lvl3pPr>
-            <a:lvl4pPr marL="564281" indent="0">
-              <a:buNone/>
-              <a:defRPr sz="800"/>
+            <a:lvl4pPr marL="940506" indent="0">
+              <a:buNone/>
+              <a:defRPr sz="1400"/>
             </a:lvl4pPr>
-            <a:lvl5pPr marL="752375" indent="0">
-              <a:buNone/>
-              <a:defRPr sz="800"/>
+            <a:lvl5pPr marL="1254008" indent="0">
+              <a:buNone/>
+              <a:defRPr sz="1400"/>
             </a:lvl5pPr>
-            <a:lvl6pPr marL="940468" indent="0">
-              <a:buNone/>
-              <a:defRPr sz="800"/>
+            <a:lvl6pPr marL="1567510" indent="0">
+              <a:buNone/>
+              <a:defRPr sz="1400"/>
             </a:lvl6pPr>
-            <a:lvl7pPr marL="1128562" indent="0">
-              <a:buNone/>
-              <a:defRPr sz="800"/>
+            <a:lvl7pPr marL="1881012" indent="0">
+              <a:buNone/>
+              <a:defRPr sz="1400"/>
             </a:lvl7pPr>
-            <a:lvl8pPr marL="1316656" indent="0">
-              <a:buNone/>
-              <a:defRPr sz="800"/>
+            <a:lvl8pPr marL="2194514" indent="0">
+              <a:buNone/>
+              <a:defRPr sz="1400"/>
             </a:lvl8pPr>
-            <a:lvl9pPr marL="1504750" indent="0">
-              <a:buNone/>
-              <a:defRPr sz="800"/>
+            <a:lvl9pPr marL="2508016" indent="0">
+              <a:buNone/>
+              <a:defRPr sz="1400"/>
             </a:lvl9pPr>
           </a:lstStyle>
           <a:p>
@@ -2442,8 +2442,8 @@
         </p:nvSpPr>
         <p:spPr>
           <a:xfrm>
-            <a:off x="1613060" y="2146938"/>
-            <a:ext cx="4937760" cy="321945"/>
+            <a:off x="2688434" y="3578228"/>
+            <a:ext cx="8229600" cy="536575"/>
           </a:xfrm>
         </p:spPr>
         <p:txBody>
@@ -2451,39 +2451,39 @@
           <a:lstStyle>
             <a:lvl1pPr marL="0" indent="0">
               <a:buNone/>
+              <a:defRPr sz="1000"/>
+            </a:lvl1pPr>
+            <a:lvl2pPr marL="313502" indent="0">
+              <a:buNone/>
+              <a:defRPr sz="800"/>
+            </a:lvl2pPr>
+            <a:lvl3pPr marL="627004" indent="0">
+              <a:buNone/>
+              <a:defRPr sz="700"/>
+            </a:lvl3pPr>
+            <a:lvl4pPr marL="940506" indent="0">
+              <a:buNone/>
               <a:defRPr sz="600"/>
-            </a:lvl1pPr>
-            <a:lvl2pPr marL="188093" indent="0">
-              <a:buNone/>
-              <a:defRPr sz="500"/>
-            </a:lvl2pPr>
-            <a:lvl3pPr marL="376187" indent="0">
-              <a:buNone/>
-              <a:defRPr sz="400"/>
-            </a:lvl3pPr>
-            <a:lvl4pPr marL="564281" indent="0">
-              <a:buNone/>
-              <a:defRPr sz="400"/>
             </a:lvl4pPr>
-            <a:lvl5pPr marL="752375" indent="0">
-              <a:buNone/>
-              <a:defRPr sz="400"/>
+            <a:lvl5pPr marL="1254008" indent="0">
+              <a:buNone/>
+              <a:defRPr sz="600"/>
             </a:lvl5pPr>
-            <a:lvl6pPr marL="940468" indent="0">
-              <a:buNone/>
-              <a:defRPr sz="400"/>
+            <a:lvl6pPr marL="1567510" indent="0">
+              <a:buNone/>
+              <a:defRPr sz="600"/>
             </a:lvl6pPr>
-            <a:lvl7pPr marL="1128562" indent="0">
-              <a:buNone/>
-              <a:defRPr sz="400"/>
+            <a:lvl7pPr marL="1881012" indent="0">
+              <a:buNone/>
+              <a:defRPr sz="600"/>
             </a:lvl7pPr>
-            <a:lvl8pPr marL="1316656" indent="0">
-              <a:buNone/>
-              <a:defRPr sz="400"/>
+            <a:lvl8pPr marL="2194514" indent="0">
+              <a:buNone/>
+              <a:defRPr sz="600"/>
             </a:lvl8pPr>
-            <a:lvl9pPr marL="1504750" indent="0">
-              <a:buNone/>
-              <a:defRPr sz="400"/>
+            <a:lvl9pPr marL="2508016" indent="0">
+              <a:buNone/>
+              <a:defRPr sz="600"/>
             </a:lvl9pPr>
           </a:lstStyle>
           <a:p>
@@ -2512,7 +2512,7 @@
           <a:p>
             <a:fld id="{6666019B-6789-7642-8563-2C9E17E98A28}" type="datetimeFigureOut">
               <a:rPr lang="en-US" smtClean="0"/>
-              <a:t>9/5/16</a:t>
+              <a:t>9/10/16</a:t>
             </a:fld>
             <a:endParaRPr lang="en-US"/>
           </a:p>
@@ -2607,15 +2607,15 @@
         </p:nvSpPr>
         <p:spPr>
           <a:xfrm>
-            <a:off x="411480" y="109855"/>
-            <a:ext cx="7406640" cy="457200"/>
+            <a:off x="685800" y="183092"/>
+            <a:ext cx="12344400" cy="762000"/>
           </a:xfrm>
           <a:prstGeom prst="rect">
             <a:avLst/>
           </a:prstGeom>
         </p:spPr>
         <p:txBody>
-          <a:bodyPr vert="horz" lIns="37618" tIns="18809" rIns="37618" bIns="18809" rtlCol="0" anchor="ctr">
+          <a:bodyPr vert="horz" lIns="62700" tIns="31350" rIns="62700" bIns="31350" rtlCol="0" anchor="ctr">
             <a:normAutofit/>
           </a:bodyPr>
           <a:lstStyle/>
@@ -2640,15 +2640,15 @@
         </p:nvSpPr>
         <p:spPr>
           <a:xfrm>
-            <a:off x="411480" y="640082"/>
-            <a:ext cx="7406640" cy="1810385"/>
+            <a:off x="685800" y="1066803"/>
+            <a:ext cx="12344400" cy="3017309"/>
           </a:xfrm>
           <a:prstGeom prst="rect">
             <a:avLst/>
           </a:prstGeom>
         </p:spPr>
         <p:txBody>
-          <a:bodyPr vert="horz" lIns="37618" tIns="18809" rIns="37618" bIns="18809" rtlCol="0">
+          <a:bodyPr vert="horz" lIns="62700" tIns="31350" rIns="62700" bIns="31350" rtlCol="0">
             <a:normAutofit/>
           </a:bodyPr>
           <a:lstStyle/>
@@ -2702,18 +2702,18 @@
         </p:nvSpPr>
         <p:spPr>
           <a:xfrm>
-            <a:off x="411480" y="2542542"/>
-            <a:ext cx="1920240" cy="146050"/>
+            <a:off x="685800" y="4237570"/>
+            <a:ext cx="3200400" cy="243417"/>
           </a:xfrm>
           <a:prstGeom prst="rect">
             <a:avLst/>
           </a:prstGeom>
         </p:spPr>
         <p:txBody>
-          <a:bodyPr vert="horz" lIns="37618" tIns="18809" rIns="37618" bIns="18809" rtlCol="0" anchor="ctr"/>
+          <a:bodyPr vert="horz" lIns="62700" tIns="31350" rIns="62700" bIns="31350" rtlCol="0" anchor="ctr"/>
           <a:lstStyle>
             <a:lvl1pPr algn="l">
-              <a:defRPr sz="500">
+              <a:defRPr sz="800">
                 <a:solidFill>
                   <a:schemeClr val="tx1">
                     <a:tint val="75000"/>
@@ -2725,7 +2725,7 @@
           <a:p>
             <a:fld id="{6666019B-6789-7642-8563-2C9E17E98A28}" type="datetimeFigureOut">
               <a:rPr lang="en-US" smtClean="0"/>
-              <a:t>9/5/16</a:t>
+              <a:t>9/10/16</a:t>
             </a:fld>
             <a:endParaRPr lang="en-US"/>
           </a:p>
@@ -2743,18 +2743,18 @@
         </p:nvSpPr>
         <p:spPr>
           <a:xfrm>
-            <a:off x="2811780" y="2542542"/>
-            <a:ext cx="2606040" cy="146050"/>
+            <a:off x="4686300" y="4237570"/>
+            <a:ext cx="4343400" cy="243417"/>
           </a:xfrm>
           <a:prstGeom prst="rect">
             <a:avLst/>
           </a:prstGeom>
         </p:spPr>
         <p:txBody>
-          <a:bodyPr vert="horz" lIns="37618" tIns="18809" rIns="37618" bIns="18809" rtlCol="0" anchor="ctr"/>
+          <a:bodyPr vert="horz" lIns="62700" tIns="31350" rIns="62700" bIns="31350" rtlCol="0" anchor="ctr"/>
           <a:lstStyle>
             <a:lvl1pPr algn="ctr">
-              <a:defRPr sz="500">
+              <a:defRPr sz="800">
                 <a:solidFill>
                   <a:schemeClr val="tx1">
                     <a:tint val="75000"/>
@@ -2780,18 +2780,18 @@
         </p:nvSpPr>
         <p:spPr>
           <a:xfrm>
-            <a:off x="5897880" y="2542542"/>
-            <a:ext cx="1920240" cy="146050"/>
+            <a:off x="9829800" y="4237570"/>
+            <a:ext cx="3200400" cy="243417"/>
           </a:xfrm>
           <a:prstGeom prst="rect">
             <a:avLst/>
           </a:prstGeom>
         </p:spPr>
         <p:txBody>
-          <a:bodyPr vert="horz" lIns="37618" tIns="18809" rIns="37618" bIns="18809" rtlCol="0" anchor="ctr"/>
+          <a:bodyPr vert="horz" lIns="62700" tIns="31350" rIns="62700" bIns="31350" rtlCol="0" anchor="ctr"/>
           <a:lstStyle>
             <a:lvl1pPr algn="r">
-              <a:defRPr sz="500">
+              <a:defRPr sz="800">
                 <a:solidFill>
                   <a:schemeClr val="tx1">
                     <a:tint val="75000"/>
@@ -2832,12 +2832,12 @@
   </p:sldLayoutIdLst>
   <p:txStyles>
     <p:titleStyle>
-      <a:lvl1pPr algn="ctr" defTabSz="188093" rtl="0" eaLnBrk="1" latinLnBrk="0" hangingPunct="1">
+      <a:lvl1pPr algn="ctr" defTabSz="313502" rtl="0" eaLnBrk="1" latinLnBrk="0" hangingPunct="1">
         <a:spcBef>
           <a:spcPct val="0"/>
         </a:spcBef>
         <a:buNone/>
-        <a:defRPr sz="1800" kern="1200">
+        <a:defRPr sz="3000" kern="1200">
           <a:solidFill>
             <a:schemeClr val="tx1"/>
           </a:solidFill>
@@ -2848,13 +2848,13 @@
       </a:lvl1pPr>
     </p:titleStyle>
     <p:bodyStyle>
-      <a:lvl1pPr marL="141070" indent="-141070" algn="l" defTabSz="188093" rtl="0" eaLnBrk="1" latinLnBrk="0" hangingPunct="1">
+      <a:lvl1pPr marL="235127" indent="-235127" algn="l" defTabSz="313502" rtl="0" eaLnBrk="1" latinLnBrk="0" hangingPunct="1">
         <a:spcBef>
           <a:spcPct val="20000"/>
         </a:spcBef>
         <a:buFont typeface="Arial"/>
         <a:buChar char="•"/>
-        <a:defRPr sz="1300" kern="1200">
+        <a:defRPr sz="2200" kern="1200">
           <a:solidFill>
             <a:schemeClr val="tx1"/>
           </a:solidFill>
@@ -2863,13 +2863,13 @@
           <a:cs typeface="+mn-cs"/>
         </a:defRPr>
       </a:lvl1pPr>
-      <a:lvl2pPr marL="305653" indent="-117558" algn="l" defTabSz="188093" rtl="0" eaLnBrk="1" latinLnBrk="0" hangingPunct="1">
+      <a:lvl2pPr marL="509441" indent="-195939" algn="l" defTabSz="313502" rtl="0" eaLnBrk="1" latinLnBrk="0" hangingPunct="1">
         <a:spcBef>
           <a:spcPct val="20000"/>
         </a:spcBef>
         <a:buFont typeface="Arial"/>
         <a:buChar char="–"/>
-        <a:defRPr sz="1100" kern="1200">
+        <a:defRPr sz="1900" kern="1200">
           <a:solidFill>
             <a:schemeClr val="tx1"/>
           </a:solidFill>
@@ -2878,13 +2878,13 @@
           <a:cs typeface="+mn-cs"/>
         </a:defRPr>
       </a:lvl2pPr>
-      <a:lvl3pPr marL="470234" indent="-94047" algn="l" defTabSz="188093" rtl="0" eaLnBrk="1" latinLnBrk="0" hangingPunct="1">
+      <a:lvl3pPr marL="783755" indent="-156751" algn="l" defTabSz="313502" rtl="0" eaLnBrk="1" latinLnBrk="0" hangingPunct="1">
         <a:spcBef>
           <a:spcPct val="20000"/>
         </a:spcBef>
         <a:buFont typeface="Arial"/>
         <a:buChar char="•"/>
-        <a:defRPr sz="1000" kern="1200">
+        <a:defRPr sz="1600" kern="1200">
           <a:solidFill>
             <a:schemeClr val="tx1"/>
           </a:solidFill>
@@ -2893,13 +2893,13 @@
           <a:cs typeface="+mn-cs"/>
         </a:defRPr>
       </a:lvl3pPr>
-      <a:lvl4pPr marL="658328" indent="-94047" algn="l" defTabSz="188093" rtl="0" eaLnBrk="1" latinLnBrk="0" hangingPunct="1">
+      <a:lvl4pPr marL="1097257" indent="-156751" algn="l" defTabSz="313502" rtl="0" eaLnBrk="1" latinLnBrk="0" hangingPunct="1">
         <a:spcBef>
           <a:spcPct val="20000"/>
         </a:spcBef>
         <a:buFont typeface="Arial"/>
         <a:buChar char="–"/>
-        <a:defRPr sz="800" kern="1200">
+        <a:defRPr sz="1400" kern="1200">
           <a:solidFill>
             <a:schemeClr val="tx1"/>
           </a:solidFill>
@@ -2908,13 +2908,13 @@
           <a:cs typeface="+mn-cs"/>
         </a:defRPr>
       </a:lvl4pPr>
-      <a:lvl5pPr marL="846421" indent="-94047" algn="l" defTabSz="188093" rtl="0" eaLnBrk="1" latinLnBrk="0" hangingPunct="1">
+      <a:lvl5pPr marL="1410759" indent="-156751" algn="l" defTabSz="313502" rtl="0" eaLnBrk="1" latinLnBrk="0" hangingPunct="1">
         <a:spcBef>
           <a:spcPct val="20000"/>
         </a:spcBef>
         <a:buFont typeface="Arial"/>
         <a:buChar char="»"/>
-        <a:defRPr sz="800" kern="1200">
+        <a:defRPr sz="1400" kern="1200">
           <a:solidFill>
             <a:schemeClr val="tx1"/>
           </a:solidFill>
@@ -2923,13 +2923,13 @@
           <a:cs typeface="+mn-cs"/>
         </a:defRPr>
       </a:lvl5pPr>
-      <a:lvl6pPr marL="1034516" indent="-94047" algn="l" defTabSz="188093" rtl="0" eaLnBrk="1" latinLnBrk="0" hangingPunct="1">
+      <a:lvl6pPr marL="1724261" indent="-156751" algn="l" defTabSz="313502" rtl="0" eaLnBrk="1" latinLnBrk="0" hangingPunct="1">
         <a:spcBef>
           <a:spcPct val="20000"/>
         </a:spcBef>
         <a:buFont typeface="Arial"/>
         <a:buChar char="•"/>
-        <a:defRPr sz="800" kern="1200">
+        <a:defRPr sz="1400" kern="1200">
           <a:solidFill>
             <a:schemeClr val="tx1"/>
           </a:solidFill>
@@ -2938,13 +2938,13 @@
           <a:cs typeface="+mn-cs"/>
         </a:defRPr>
       </a:lvl6pPr>
-      <a:lvl7pPr marL="1222609" indent="-94047" algn="l" defTabSz="188093" rtl="0" eaLnBrk="1" latinLnBrk="0" hangingPunct="1">
+      <a:lvl7pPr marL="2037763" indent="-156751" algn="l" defTabSz="313502" rtl="0" eaLnBrk="1" latinLnBrk="0" hangingPunct="1">
         <a:spcBef>
           <a:spcPct val="20000"/>
         </a:spcBef>
         <a:buFont typeface="Arial"/>
         <a:buChar char="•"/>
-        <a:defRPr sz="800" kern="1200">
+        <a:defRPr sz="1400" kern="1200">
           <a:solidFill>
             <a:schemeClr val="tx1"/>
           </a:solidFill>
@@ -2953,13 +2953,13 @@
           <a:cs typeface="+mn-cs"/>
         </a:defRPr>
       </a:lvl7pPr>
-      <a:lvl8pPr marL="1410703" indent="-94047" algn="l" defTabSz="188093" rtl="0" eaLnBrk="1" latinLnBrk="0" hangingPunct="1">
+      <a:lvl8pPr marL="2351265" indent="-156751" algn="l" defTabSz="313502" rtl="0" eaLnBrk="1" latinLnBrk="0" hangingPunct="1">
         <a:spcBef>
           <a:spcPct val="20000"/>
         </a:spcBef>
         <a:buFont typeface="Arial"/>
         <a:buChar char="•"/>
-        <a:defRPr sz="800" kern="1200">
+        <a:defRPr sz="1400" kern="1200">
           <a:solidFill>
             <a:schemeClr val="tx1"/>
           </a:solidFill>
@@ -2968,13 +2968,13 @@
           <a:cs typeface="+mn-cs"/>
         </a:defRPr>
       </a:lvl8pPr>
-      <a:lvl9pPr marL="1598796" indent="-94047" algn="l" defTabSz="188093" rtl="0" eaLnBrk="1" latinLnBrk="0" hangingPunct="1">
+      <a:lvl9pPr marL="2664767" indent="-156751" algn="l" defTabSz="313502" rtl="0" eaLnBrk="1" latinLnBrk="0" hangingPunct="1">
         <a:spcBef>
           <a:spcPct val="20000"/>
         </a:spcBef>
         <a:buFont typeface="Arial"/>
         <a:buChar char="•"/>
-        <a:defRPr sz="800" kern="1200">
+        <a:defRPr sz="1400" kern="1200">
           <a:solidFill>
             <a:schemeClr val="tx1"/>
           </a:solidFill>
@@ -2988,8 +2988,8 @@
       <a:defPPr>
         <a:defRPr lang="en-US"/>
       </a:defPPr>
-      <a:lvl1pPr marL="0" algn="l" defTabSz="188093" rtl="0" eaLnBrk="1" latinLnBrk="0" hangingPunct="1">
-        <a:defRPr sz="700" kern="1200">
+      <a:lvl1pPr marL="0" algn="l" defTabSz="313502" rtl="0" eaLnBrk="1" latinLnBrk="0" hangingPunct="1">
+        <a:defRPr sz="1200" kern="1200">
           <a:solidFill>
             <a:schemeClr val="tx1"/>
           </a:solidFill>
@@ -2998,8 +2998,8 @@
           <a:cs typeface="+mn-cs"/>
         </a:defRPr>
       </a:lvl1pPr>
-      <a:lvl2pPr marL="188093" algn="l" defTabSz="188093" rtl="0" eaLnBrk="1" latinLnBrk="0" hangingPunct="1">
-        <a:defRPr sz="700" kern="1200">
+      <a:lvl2pPr marL="313502" algn="l" defTabSz="313502" rtl="0" eaLnBrk="1" latinLnBrk="0" hangingPunct="1">
+        <a:defRPr sz="1200" kern="1200">
           <a:solidFill>
             <a:schemeClr val="tx1"/>
           </a:solidFill>
@@ -3008,8 +3008,8 @@
           <a:cs typeface="+mn-cs"/>
         </a:defRPr>
       </a:lvl2pPr>
-      <a:lvl3pPr marL="376187" algn="l" defTabSz="188093" rtl="0" eaLnBrk="1" latinLnBrk="0" hangingPunct="1">
-        <a:defRPr sz="700" kern="1200">
+      <a:lvl3pPr marL="627004" algn="l" defTabSz="313502" rtl="0" eaLnBrk="1" latinLnBrk="0" hangingPunct="1">
+        <a:defRPr sz="1200" kern="1200">
           <a:solidFill>
             <a:schemeClr val="tx1"/>
           </a:solidFill>
@@ -3018,8 +3018,8 @@
           <a:cs typeface="+mn-cs"/>
         </a:defRPr>
       </a:lvl3pPr>
-      <a:lvl4pPr marL="564281" algn="l" defTabSz="188093" rtl="0" eaLnBrk="1" latinLnBrk="0" hangingPunct="1">
-        <a:defRPr sz="700" kern="1200">
+      <a:lvl4pPr marL="940506" algn="l" defTabSz="313502" rtl="0" eaLnBrk="1" latinLnBrk="0" hangingPunct="1">
+        <a:defRPr sz="1200" kern="1200">
           <a:solidFill>
             <a:schemeClr val="tx1"/>
           </a:solidFill>
@@ -3028,8 +3028,8 @@
           <a:cs typeface="+mn-cs"/>
         </a:defRPr>
       </a:lvl4pPr>
-      <a:lvl5pPr marL="752375" algn="l" defTabSz="188093" rtl="0" eaLnBrk="1" latinLnBrk="0" hangingPunct="1">
-        <a:defRPr sz="700" kern="1200">
+      <a:lvl5pPr marL="1254008" algn="l" defTabSz="313502" rtl="0" eaLnBrk="1" latinLnBrk="0" hangingPunct="1">
+        <a:defRPr sz="1200" kern="1200">
           <a:solidFill>
             <a:schemeClr val="tx1"/>
           </a:solidFill>
@@ -3038,8 +3038,8 @@
           <a:cs typeface="+mn-cs"/>
         </a:defRPr>
       </a:lvl5pPr>
-      <a:lvl6pPr marL="940468" algn="l" defTabSz="188093" rtl="0" eaLnBrk="1" latinLnBrk="0" hangingPunct="1">
-        <a:defRPr sz="700" kern="1200">
+      <a:lvl6pPr marL="1567510" algn="l" defTabSz="313502" rtl="0" eaLnBrk="1" latinLnBrk="0" hangingPunct="1">
+        <a:defRPr sz="1200" kern="1200">
           <a:solidFill>
             <a:schemeClr val="tx1"/>
           </a:solidFill>
@@ -3048,8 +3048,8 @@
           <a:cs typeface="+mn-cs"/>
         </a:defRPr>
       </a:lvl6pPr>
-      <a:lvl7pPr marL="1128562" algn="l" defTabSz="188093" rtl="0" eaLnBrk="1" latinLnBrk="0" hangingPunct="1">
-        <a:defRPr sz="700" kern="1200">
+      <a:lvl7pPr marL="1881012" algn="l" defTabSz="313502" rtl="0" eaLnBrk="1" latinLnBrk="0" hangingPunct="1">
+        <a:defRPr sz="1200" kern="1200">
           <a:solidFill>
             <a:schemeClr val="tx1"/>
           </a:solidFill>
@@ -3058,8 +3058,8 @@
           <a:cs typeface="+mn-cs"/>
         </a:defRPr>
       </a:lvl7pPr>
-      <a:lvl8pPr marL="1316656" algn="l" defTabSz="188093" rtl="0" eaLnBrk="1" latinLnBrk="0" hangingPunct="1">
-        <a:defRPr sz="700" kern="1200">
+      <a:lvl8pPr marL="2194514" algn="l" defTabSz="313502" rtl="0" eaLnBrk="1" latinLnBrk="0" hangingPunct="1">
+        <a:defRPr sz="1200" kern="1200">
           <a:solidFill>
             <a:schemeClr val="tx1"/>
           </a:solidFill>
@@ -3068,8 +3068,8 @@
           <a:cs typeface="+mn-cs"/>
         </a:defRPr>
       </a:lvl8pPr>
-      <a:lvl9pPr marL="1504750" algn="l" defTabSz="188093" rtl="0" eaLnBrk="1" latinLnBrk="0" hangingPunct="1">
-        <a:defRPr sz="700" kern="1200">
+      <a:lvl9pPr marL="2508016" algn="l" defTabSz="313502" rtl="0" eaLnBrk="1" latinLnBrk="0" hangingPunct="1">
+        <a:defRPr sz="1200" kern="1200">
           <a:solidFill>
             <a:schemeClr val="tx1"/>
           </a:solidFill>
@@ -3108,8 +3108,8 @@
         </p:nvSpPr>
         <p:spPr>
           <a:xfrm>
-            <a:off x="889966" y="1443273"/>
-            <a:ext cx="712551" cy="712605"/>
+            <a:off x="1483274" y="2405452"/>
+            <a:ext cx="1187585" cy="1187675"/>
           </a:xfrm>
           <a:prstGeom prst="ellipse">
             <a:avLst/>
@@ -3136,11 +3136,11 @@
           </a:fontRef>
         </p:style>
         <p:txBody>
-          <a:bodyPr lIns="54862" tIns="27431" rIns="54862" bIns="27431" rtlCol="0" anchor="ctr"/>
+          <a:bodyPr rtlCol="0" anchor="ctr"/>
           <a:lstStyle/>
           <a:p>
             <a:pPr algn="ctr"/>
-            <a:endParaRPr lang="en-US" sz="2400">
+            <a:endParaRPr lang="en-US" sz="4000">
               <a:latin typeface="Times New Roman"/>
               <a:cs typeface="Times New Roman"/>
             </a:endParaRPr>
@@ -3155,8 +3155,8 @@
         </p:nvSpPr>
         <p:spPr>
           <a:xfrm>
-            <a:off x="48757" y="2155877"/>
-            <a:ext cx="2731448" cy="445378"/>
+            <a:off x="81262" y="3593128"/>
+            <a:ext cx="4552413" cy="742297"/>
           </a:xfrm>
           <a:prstGeom prst="rect">
             <a:avLst/>
@@ -3183,11 +3183,11 @@
           </a:fontRef>
         </p:style>
         <p:txBody>
-          <a:bodyPr lIns="54862" tIns="27431" rIns="54862" bIns="27431" rtlCol="0" anchor="ctr"/>
+          <a:bodyPr rtlCol="0" anchor="ctr"/>
           <a:lstStyle/>
           <a:p>
             <a:pPr algn="ctr"/>
-            <a:endParaRPr lang="en-US" sz="2400">
+            <a:endParaRPr lang="en-US" sz="4000">
               <a:latin typeface="Times New Roman"/>
               <a:cs typeface="Times New Roman"/>
             </a:endParaRPr>
@@ -3202,8 +3202,8 @@
         </p:nvCxnSpPr>
         <p:spPr>
           <a:xfrm>
-            <a:off x="1246242" y="1779775"/>
-            <a:ext cx="1187586" cy="395892"/>
+            <a:off x="2077070" y="2966291"/>
+            <a:ext cx="1979310" cy="659820"/>
           </a:xfrm>
           <a:prstGeom prst="straightConnector1">
             <a:avLst/>
@@ -3238,8 +3238,8 @@
         </p:nvCxnSpPr>
         <p:spPr>
           <a:xfrm>
-            <a:off x="1246242" y="1779775"/>
-            <a:ext cx="1187586" cy="0"/>
+            <a:off x="2077070" y="2966291"/>
+            <a:ext cx="1979310" cy="0"/>
           </a:xfrm>
           <a:prstGeom prst="straightConnector1">
             <a:avLst/>
@@ -3274,8 +3274,8 @@
         </p:nvCxnSpPr>
         <p:spPr>
           <a:xfrm>
-            <a:off x="1246242" y="1779775"/>
-            <a:ext cx="0" cy="395892"/>
+            <a:off x="2077070" y="2966291"/>
+            <a:ext cx="0" cy="659820"/>
           </a:xfrm>
           <a:prstGeom prst="straightConnector1">
             <a:avLst/>
@@ -3310,8 +3310,8 @@
         </p:nvCxnSpPr>
         <p:spPr>
           <a:xfrm flipV="1">
-            <a:off x="1246242" y="1383883"/>
-            <a:ext cx="0" cy="395892"/>
+            <a:off x="2077070" y="2306471"/>
+            <a:ext cx="0" cy="659820"/>
           </a:xfrm>
           <a:prstGeom prst="straightConnector1">
             <a:avLst/>
@@ -3346,8 +3346,8 @@
         </p:nvCxnSpPr>
         <p:spPr>
           <a:xfrm flipH="1">
-            <a:off x="564614" y="1779775"/>
-            <a:ext cx="671729" cy="9902"/>
+            <a:off x="941024" y="2966291"/>
+            <a:ext cx="1119548" cy="16504"/>
           </a:xfrm>
           <a:prstGeom prst="straightConnector1">
             <a:avLst/>
@@ -3382,8 +3382,8 @@
         </p:nvSpPr>
         <p:spPr>
           <a:xfrm>
-            <a:off x="1092845" y="1002230"/>
-            <a:ext cx="311741" cy="424732"/>
+            <a:off x="1821405" y="1670382"/>
+            <a:ext cx="519569" cy="707886"/>
           </a:xfrm>
           <a:prstGeom prst="rect">
             <a:avLst/>
@@ -3394,13 +3394,13 @@
           </a:ln>
         </p:spPr>
         <p:txBody>
-          <a:bodyPr wrap="square" lIns="54862" tIns="27431" rIns="54862" bIns="27431" rtlCol="0">
+          <a:bodyPr wrap="square" rtlCol="0">
             <a:spAutoFit/>
           </a:bodyPr>
           <a:lstStyle/>
           <a:p>
             <a:r>
-              <a:rPr lang="en-US" sz="2400" i="1" dirty="0">
+              <a:rPr lang="en-US" sz="4000" i="1" dirty="0">
                 <a:solidFill>
                   <a:srgbClr val="FF6600"/>
                 </a:solidFill>
@@ -3420,8 +3420,8 @@
         </p:nvSpPr>
         <p:spPr>
           <a:xfrm>
-            <a:off x="208728" y="1314500"/>
-            <a:ext cx="779354" cy="424732"/>
+            <a:off x="347879" y="2190832"/>
+            <a:ext cx="1298923" cy="707886"/>
           </a:xfrm>
           <a:prstGeom prst="rect">
             <a:avLst/>
@@ -3429,13 +3429,13 @@
           <a:noFill/>
         </p:spPr>
         <p:txBody>
-          <a:bodyPr wrap="square" lIns="54862" tIns="27431" rIns="54862" bIns="27431" rtlCol="0">
+          <a:bodyPr wrap="square" rtlCol="0">
             <a:spAutoFit/>
           </a:bodyPr>
           <a:lstStyle/>
           <a:p>
             <a:r>
-              <a:rPr lang="en-US" sz="2400" i="1" dirty="0" err="1">
+              <a:rPr lang="en-US" sz="4000" i="1" dirty="0" err="1" smtClean="0">
                 <a:solidFill>
                   <a:srgbClr val="FF0000"/>
                 </a:solidFill>
@@ -3445,7 +3445,7 @@
               <a:t>F</a:t>
             </a:r>
             <a:r>
-              <a:rPr lang="en-US" sz="2400" i="1" baseline="-25000" dirty="0" err="1">
+              <a:rPr lang="en-US" sz="4000" i="1" baseline="-25000" dirty="0" err="1" smtClean="0">
                 <a:solidFill>
                   <a:srgbClr val="FF0000"/>
                 </a:solidFill>
@@ -3454,7 +3454,7 @@
               </a:rPr>
               <a:t>f</a:t>
             </a:r>
-            <a:endParaRPr lang="en-US" sz="2400" i="1" dirty="0">
+            <a:endParaRPr lang="en-US" sz="4000" i="1" dirty="0">
               <a:solidFill>
                 <a:srgbClr val="FF0000"/>
               </a:solidFill>
@@ -3472,8 +3472,8 @@
         </p:nvSpPr>
         <p:spPr>
           <a:xfrm>
-            <a:off x="1654475" y="1328682"/>
-            <a:ext cx="1210733" cy="424732"/>
+            <a:off x="2757457" y="2214471"/>
+            <a:ext cx="2017888" cy="707886"/>
           </a:xfrm>
           <a:prstGeom prst="rect">
             <a:avLst/>
@@ -3481,13 +3481,13 @@
           <a:noFill/>
         </p:spPr>
         <p:txBody>
-          <a:bodyPr wrap="square" lIns="54862" tIns="27431" rIns="54862" bIns="27431" rtlCol="0">
+          <a:bodyPr wrap="square" rtlCol="0">
             <a:spAutoFit/>
           </a:bodyPr>
           <a:lstStyle/>
           <a:p>
             <a:r>
-              <a:rPr lang="en-US" sz="2400" i="1" dirty="0" err="1">
+              <a:rPr lang="en-US" sz="4000" i="1" dirty="0" err="1" smtClean="0">
                 <a:solidFill>
                   <a:srgbClr val="000000"/>
                 </a:solidFill>
@@ -3497,7 +3497,7 @@
               <a:t>F</a:t>
             </a:r>
             <a:r>
-              <a:rPr lang="en-US" sz="2400" dirty="0" err="1">
+              <a:rPr lang="en-US" sz="4000" dirty="0" err="1" smtClean="0">
                 <a:solidFill>
                   <a:srgbClr val="000000"/>
                 </a:solidFill>
@@ -3507,7 +3507,7 @@
               <a:t>sin</a:t>
             </a:r>
             <a:r>
-              <a:rPr lang="en-US" sz="2400" dirty="0">
+              <a:rPr lang="en-US" sz="4000" dirty="0" smtClean="0">
                 <a:solidFill>
                   <a:srgbClr val="000000"/>
                 </a:solidFill>
@@ -3517,7 +3517,7 @@
               <a:t>(</a:t>
             </a:r>
             <a:r>
-              <a:rPr lang="en-US" sz="2400" i="1" dirty="0" err="1">
+              <a:rPr lang="en-US" sz="4000" i="1" dirty="0" err="1" smtClean="0">
                 <a:solidFill>
                   <a:srgbClr val="000000"/>
                 </a:solidFill>
@@ -3527,7 +3527,7 @@
               <a:t>θ</a:t>
             </a:r>
             <a:r>
-              <a:rPr lang="en-US" sz="2400" dirty="0">
+              <a:rPr lang="en-US" sz="4000" dirty="0" smtClean="0">
                 <a:solidFill>
                   <a:srgbClr val="000000"/>
                 </a:solidFill>
@@ -3547,8 +3547,8 @@
         </p:nvSpPr>
         <p:spPr>
           <a:xfrm>
-            <a:off x="-44683" y="1763823"/>
-            <a:ext cx="1166557" cy="424732"/>
+            <a:off x="-74472" y="2939705"/>
+            <a:ext cx="1944261" cy="707886"/>
           </a:xfrm>
           <a:prstGeom prst="rect">
             <a:avLst/>
@@ -3556,13 +3556,13 @@
           <a:noFill/>
         </p:spPr>
         <p:txBody>
-          <a:bodyPr wrap="square" lIns="54862" tIns="27431" rIns="54862" bIns="27431" rtlCol="0">
+          <a:bodyPr wrap="square" rtlCol="0">
             <a:spAutoFit/>
           </a:bodyPr>
           <a:lstStyle/>
           <a:p>
             <a:r>
-              <a:rPr lang="en-US" sz="2400" i="1" dirty="0" err="1">
+              <a:rPr lang="en-US" sz="4000" i="1" dirty="0" err="1" smtClean="0">
                 <a:solidFill>
                   <a:srgbClr val="0000FF"/>
                 </a:solidFill>
@@ -3572,7 +3572,7 @@
               <a:t>F</a:t>
             </a:r>
             <a:r>
-              <a:rPr lang="en-US" sz="2400" dirty="0" err="1">
+              <a:rPr lang="en-US" sz="4000" dirty="0" err="1" smtClean="0">
                 <a:solidFill>
                   <a:srgbClr val="0000FF"/>
                 </a:solidFill>
@@ -3582,7 +3582,7 @@
               <a:t>cos</a:t>
             </a:r>
             <a:r>
-              <a:rPr lang="en-US" sz="2400" dirty="0">
+              <a:rPr lang="en-US" sz="4000" dirty="0" smtClean="0">
                 <a:solidFill>
                   <a:srgbClr val="0000FF"/>
                 </a:solidFill>
@@ -3592,7 +3592,7 @@
               <a:t>(</a:t>
             </a:r>
             <a:r>
-              <a:rPr lang="en-US" sz="2400" i="1" dirty="0" err="1">
+              <a:rPr lang="en-US" sz="4000" i="1" dirty="0" err="1" smtClean="0">
                 <a:solidFill>
                   <a:srgbClr val="0000FF"/>
                 </a:solidFill>
@@ -3602,7 +3602,7 @@
               <a:t>θ</a:t>
             </a:r>
             <a:r>
-              <a:rPr lang="en-US" sz="2400" dirty="0">
+              <a:rPr lang="en-US" sz="4000" dirty="0">
                 <a:solidFill>
                   <a:srgbClr val="0000FF"/>
                 </a:solidFill>
@@ -3611,7 +3611,7 @@
               </a:rPr>
               <a:t>)</a:t>
             </a:r>
-            <a:endParaRPr lang="en-US" sz="2400" dirty="0">
+            <a:endParaRPr lang="en-US" sz="4000" dirty="0" smtClean="0">
               <a:solidFill>
                 <a:srgbClr val="0000FF"/>
               </a:solidFill>
@@ -3629,8 +3629,8 @@
         </p:nvSpPr>
         <p:spPr>
           <a:xfrm>
-            <a:off x="1275217" y="1771610"/>
-            <a:ext cx="389677" cy="424732"/>
+            <a:off x="2125361" y="2952683"/>
+            <a:ext cx="649462" cy="707886"/>
           </a:xfrm>
           <a:prstGeom prst="rect">
             <a:avLst/>
@@ -3638,13 +3638,13 @@
           <a:noFill/>
         </p:spPr>
         <p:txBody>
-          <a:bodyPr wrap="square" lIns="54862" tIns="27431" rIns="54862" bIns="27431" rtlCol="0">
+          <a:bodyPr wrap="square" rtlCol="0">
             <a:spAutoFit/>
           </a:bodyPr>
           <a:lstStyle/>
           <a:p>
             <a:r>
-              <a:rPr lang="en-US" sz="2400" i="1" dirty="0" err="1">
+              <a:rPr lang="en-US" sz="4000" i="1" dirty="0" err="1" smtClean="0">
                 <a:solidFill>
                   <a:schemeClr val="bg1"/>
                 </a:solidFill>
@@ -3653,7 +3653,7 @@
               </a:rPr>
               <a:t>θ</a:t>
             </a:r>
-            <a:endParaRPr lang="en-US" sz="2400" i="1" dirty="0">
+            <a:endParaRPr lang="en-US" sz="4000" i="1" dirty="0" smtClean="0">
               <a:solidFill>
                 <a:schemeClr val="bg1"/>
               </a:solidFill>
@@ -3671,8 +3671,8 @@
         </p:nvSpPr>
         <p:spPr>
           <a:xfrm>
-            <a:off x="2390529" y="1781292"/>
-            <a:ext cx="280815" cy="424732"/>
+            <a:off x="3984213" y="2968820"/>
+            <a:ext cx="468025" cy="707886"/>
           </a:xfrm>
           <a:prstGeom prst="rect">
             <a:avLst/>
@@ -3680,13 +3680,13 @@
           <a:noFill/>
         </p:spPr>
         <p:txBody>
-          <a:bodyPr wrap="square" lIns="54862" tIns="27431" rIns="54862" bIns="27431" rtlCol="0">
+          <a:bodyPr wrap="square" rtlCol="0">
             <a:spAutoFit/>
           </a:bodyPr>
           <a:lstStyle/>
           <a:p>
             <a:r>
-              <a:rPr lang="en-US" sz="2400" i="1" dirty="0">
+              <a:rPr lang="en-US" sz="4000" i="1" dirty="0" smtClean="0">
                 <a:solidFill>
                   <a:srgbClr val="000000"/>
                 </a:solidFill>
@@ -3695,7 +3695,7 @@
               </a:rPr>
               <a:t>F</a:t>
             </a:r>
-            <a:endParaRPr lang="en-US" sz="2400" i="1" dirty="0">
+            <a:endParaRPr lang="en-US" sz="4000" i="1" dirty="0">
               <a:solidFill>
                 <a:srgbClr val="000000"/>
               </a:solidFill>
@@ -3713,8 +3713,8 @@
         </p:nvSpPr>
         <p:spPr>
           <a:xfrm>
-            <a:off x="135247" y="221071"/>
-            <a:ext cx="712551" cy="712605"/>
+            <a:off x="225409" y="368449"/>
+            <a:ext cx="1187585" cy="1187675"/>
           </a:xfrm>
           <a:prstGeom prst="ellipse">
             <a:avLst/>
@@ -3741,11 +3741,11 @@
           </a:fontRef>
         </p:style>
         <p:txBody>
-          <a:bodyPr lIns="54862" tIns="27431" rIns="54862" bIns="27431" rtlCol="0" anchor="ctr"/>
+          <a:bodyPr rtlCol="0" anchor="ctr"/>
           <a:lstStyle/>
           <a:p>
             <a:pPr algn="ctr"/>
-            <a:endParaRPr lang="en-US" sz="2400">
+            <a:endParaRPr lang="en-US" sz="4000">
               <a:latin typeface="Times New Roman"/>
               <a:cs typeface="Times New Roman"/>
             </a:endParaRPr>
@@ -3760,8 +3760,8 @@
         </p:nvCxnSpPr>
         <p:spPr>
           <a:xfrm>
-            <a:off x="510217" y="595529"/>
-            <a:ext cx="1187586" cy="395892"/>
+            <a:off x="850362" y="992548"/>
+            <a:ext cx="1979310" cy="659820"/>
           </a:xfrm>
           <a:prstGeom prst="straightConnector1">
             <a:avLst/>
@@ -3796,8 +3796,8 @@
         </p:nvSpPr>
         <p:spPr>
           <a:xfrm>
-            <a:off x="1095937" y="221069"/>
-            <a:ext cx="280815" cy="424732"/>
+            <a:off x="1826559" y="368449"/>
+            <a:ext cx="468025" cy="707886"/>
           </a:xfrm>
           <a:prstGeom prst="rect">
             <a:avLst/>
@@ -3805,13 +3805,13 @@
           <a:noFill/>
         </p:spPr>
         <p:txBody>
-          <a:bodyPr wrap="square" lIns="54862" tIns="27431" rIns="54862" bIns="27431" rtlCol="0">
+          <a:bodyPr wrap="square" rtlCol="0">
             <a:spAutoFit/>
           </a:bodyPr>
           <a:lstStyle/>
           <a:p>
             <a:r>
-              <a:rPr lang="en-US" sz="2400" i="1" dirty="0">
+              <a:rPr lang="en-US" sz="4000" i="1" dirty="0" smtClean="0">
                 <a:solidFill>
                   <a:srgbClr val="000000"/>
                 </a:solidFill>
@@ -3820,7 +3820,7 @@
               </a:rPr>
               <a:t>F</a:t>
             </a:r>
-            <a:endParaRPr lang="en-US" sz="2400" i="1" dirty="0">
+            <a:endParaRPr lang="en-US" sz="4000" i="1" dirty="0">
               <a:solidFill>
                 <a:srgbClr val="000000"/>
               </a:solidFill>
@@ -3838,8 +3838,8 @@
         </p:nvSpPr>
         <p:spPr>
           <a:xfrm rot="9276576">
-            <a:off x="1073010" y="1609262"/>
-            <a:ext cx="342998" cy="366275"/>
+            <a:off x="1788348" y="2682102"/>
+            <a:ext cx="571663" cy="610459"/>
           </a:xfrm>
           <a:prstGeom prst="blockArc">
             <a:avLst>
@@ -3872,7 +3872,7 @@
           </a:fontRef>
         </p:style>
         <p:txBody>
-          <a:bodyPr lIns="54862" tIns="27431" rIns="54862" bIns="27431" rtlCol="0" anchor="ctr"/>
+          <a:bodyPr rtlCol="0" anchor="ctr"/>
           <a:lstStyle/>
           <a:p>
             <a:pPr algn="ctr"/>
@@ -3894,8 +3894,8 @@
         </p:nvSpPr>
         <p:spPr>
           <a:xfrm>
-            <a:off x="3797856" y="1443273"/>
-            <a:ext cx="712551" cy="712605"/>
+            <a:off x="6329757" y="2405452"/>
+            <a:ext cx="1187585" cy="1187675"/>
           </a:xfrm>
           <a:prstGeom prst="ellipse">
             <a:avLst/>
@@ -3922,11 +3922,11 @@
           </a:fontRef>
         </p:style>
         <p:txBody>
-          <a:bodyPr lIns="54862" tIns="27431" rIns="54862" bIns="27431" rtlCol="0" anchor="ctr"/>
+          <a:bodyPr rtlCol="0" anchor="ctr"/>
           <a:lstStyle/>
           <a:p>
             <a:pPr algn="ctr"/>
-            <a:endParaRPr lang="en-US" sz="2400">
+            <a:endParaRPr lang="en-US" sz="4000">
               <a:latin typeface="Times New Roman"/>
               <a:cs typeface="Times New Roman"/>
             </a:endParaRPr>
@@ -3941,8 +3941,8 @@
         </p:nvSpPr>
         <p:spPr>
           <a:xfrm>
-            <a:off x="2956648" y="2155877"/>
-            <a:ext cx="2508182" cy="445378"/>
+            <a:off x="4927746" y="3593128"/>
+            <a:ext cx="4180304" cy="742297"/>
           </a:xfrm>
           <a:prstGeom prst="rect">
             <a:avLst/>
@@ -3969,11 +3969,11 @@
           </a:fontRef>
         </p:style>
         <p:txBody>
-          <a:bodyPr lIns="54862" tIns="27431" rIns="54862" bIns="27431" rtlCol="0" anchor="ctr"/>
+          <a:bodyPr rtlCol="0" anchor="ctr"/>
           <a:lstStyle/>
           <a:p>
             <a:pPr algn="ctr"/>
-            <a:endParaRPr lang="en-US" sz="2400">
+            <a:endParaRPr lang="en-US" sz="4000">
               <a:latin typeface="Times New Roman"/>
               <a:cs typeface="Times New Roman"/>
             </a:endParaRPr>
@@ -3988,8 +3988,8 @@
         </p:nvCxnSpPr>
         <p:spPr>
           <a:xfrm>
-            <a:off x="4154132" y="1779775"/>
-            <a:ext cx="1187586" cy="0"/>
+            <a:off x="6923553" y="2966291"/>
+            <a:ext cx="1979310" cy="0"/>
           </a:xfrm>
           <a:prstGeom prst="straightConnector1">
             <a:avLst/>
@@ -4024,8 +4024,8 @@
         </p:nvSpPr>
         <p:spPr>
           <a:xfrm>
-            <a:off x="4510406" y="1247649"/>
-            <a:ext cx="1210733" cy="424732"/>
+            <a:off x="7517342" y="2079415"/>
+            <a:ext cx="2017888" cy="707886"/>
           </a:xfrm>
           <a:prstGeom prst="rect">
             <a:avLst/>
@@ -4033,13 +4033,13 @@
           <a:noFill/>
         </p:spPr>
         <p:txBody>
-          <a:bodyPr wrap="square" lIns="54862" tIns="27431" rIns="54862" bIns="27431" rtlCol="0">
+          <a:bodyPr wrap="square" rtlCol="0">
             <a:spAutoFit/>
           </a:bodyPr>
           <a:lstStyle/>
           <a:p>
             <a:r>
-              <a:rPr lang="en-US" sz="2400" i="1" dirty="0" err="1">
+              <a:rPr lang="en-US" sz="4000" i="1" dirty="0" err="1" smtClean="0">
                 <a:solidFill>
                   <a:srgbClr val="008000"/>
                 </a:solidFill>
@@ -4049,7 +4049,7 @@
               <a:t>F</a:t>
             </a:r>
             <a:r>
-              <a:rPr lang="en-US" sz="2400" i="1" baseline="-25000" dirty="0" err="1">
+              <a:rPr lang="en-US" sz="4000" i="1" baseline="-25000" dirty="0" err="1" smtClean="0">
                 <a:solidFill>
                   <a:srgbClr val="008000"/>
                 </a:solidFill>
@@ -4058,7 +4058,7 @@
               </a:rPr>
               <a:t>forward</a:t>
             </a:r>
-            <a:endParaRPr lang="en-US" sz="2400" dirty="0">
+            <a:endParaRPr lang="en-US" sz="4000" dirty="0" smtClean="0">
               <a:solidFill>
                 <a:srgbClr val="008000"/>
               </a:solidFill>
@@ -4076,8 +4076,8 @@
         </p:nvSpPr>
         <p:spPr>
           <a:xfrm>
-            <a:off x="3043137" y="221071"/>
-            <a:ext cx="712551" cy="712605"/>
+            <a:off x="5071892" y="368449"/>
+            <a:ext cx="1187585" cy="1187675"/>
           </a:xfrm>
           <a:prstGeom prst="ellipse">
             <a:avLst/>
@@ -4104,11 +4104,11 @@
           </a:fontRef>
         </p:style>
         <p:txBody>
-          <a:bodyPr lIns="54862" tIns="27431" rIns="54862" bIns="27431" rtlCol="0" anchor="ctr"/>
+          <a:bodyPr rtlCol="0" anchor="ctr"/>
           <a:lstStyle/>
           <a:p>
             <a:pPr algn="ctr"/>
-            <a:endParaRPr lang="en-US" sz="2400">
+            <a:endParaRPr lang="en-US" sz="4000">
               <a:latin typeface="Times New Roman"/>
               <a:cs typeface="Times New Roman"/>
             </a:endParaRPr>
@@ -4123,8 +4123,8 @@
         </p:nvCxnSpPr>
         <p:spPr>
           <a:xfrm>
-            <a:off x="3418107" y="595529"/>
-            <a:ext cx="1187586" cy="395892"/>
+            <a:off x="5696845" y="992548"/>
+            <a:ext cx="1979310" cy="659820"/>
           </a:xfrm>
           <a:prstGeom prst="straightConnector1">
             <a:avLst/>
@@ -4159,8 +4159,8 @@
         </p:nvSpPr>
         <p:spPr>
           <a:xfrm>
-            <a:off x="4003827" y="221069"/>
-            <a:ext cx="280815" cy="424732"/>
+            <a:off x="6673042" y="368449"/>
+            <a:ext cx="468025" cy="707886"/>
           </a:xfrm>
           <a:prstGeom prst="rect">
             <a:avLst/>
@@ -4168,13 +4168,13 @@
           <a:noFill/>
         </p:spPr>
         <p:txBody>
-          <a:bodyPr wrap="square" lIns="54862" tIns="27431" rIns="54862" bIns="27431" rtlCol="0">
+          <a:bodyPr wrap="square" rtlCol="0">
             <a:spAutoFit/>
           </a:bodyPr>
           <a:lstStyle/>
           <a:p>
             <a:r>
-              <a:rPr lang="en-US" sz="2400" i="1" dirty="0">
+              <a:rPr lang="en-US" sz="4000" i="1" dirty="0" smtClean="0">
                 <a:solidFill>
                   <a:srgbClr val="000000"/>
                 </a:solidFill>
@@ -4183,7 +4183,7 @@
               </a:rPr>
               <a:t>F</a:t>
             </a:r>
-            <a:endParaRPr lang="en-US" sz="2400" i="1" dirty="0">
+            <a:endParaRPr lang="en-US" sz="4000" i="1" dirty="0">
               <a:solidFill>
                 <a:srgbClr val="000000"/>
               </a:solidFill>
@@ -4201,8 +4201,8 @@
         </p:nvCxnSpPr>
         <p:spPr>
           <a:xfrm flipH="1">
-            <a:off x="4660880" y="1779266"/>
-            <a:ext cx="671729" cy="6670"/>
+            <a:off x="7768132" y="2965441"/>
+            <a:ext cx="1119548" cy="11117"/>
           </a:xfrm>
           <a:prstGeom prst="straightConnector1">
             <a:avLst/>
@@ -4237,8 +4237,8 @@
         </p:nvCxnSpPr>
         <p:spPr>
           <a:xfrm>
-            <a:off x="4154132" y="1783293"/>
-            <a:ext cx="539788" cy="0"/>
+            <a:off x="6923553" y="2972155"/>
+            <a:ext cx="899647" cy="0"/>
           </a:xfrm>
           <a:prstGeom prst="straightConnector1">
             <a:avLst/>
@@ -4273,8 +4273,8 @@
         </p:nvSpPr>
         <p:spPr>
           <a:xfrm>
-            <a:off x="494644" y="561429"/>
-            <a:ext cx="389677" cy="424732"/>
+            <a:off x="824405" y="935715"/>
+            <a:ext cx="649462" cy="707886"/>
           </a:xfrm>
           <a:prstGeom prst="rect">
             <a:avLst/>
@@ -4282,13 +4282,13 @@
           <a:noFill/>
         </p:spPr>
         <p:txBody>
-          <a:bodyPr wrap="square" lIns="54862" tIns="27431" rIns="54862" bIns="27431" rtlCol="0">
+          <a:bodyPr wrap="square" rtlCol="0">
             <a:spAutoFit/>
           </a:bodyPr>
           <a:lstStyle/>
           <a:p>
             <a:r>
-              <a:rPr lang="en-US" sz="2400" i="1" dirty="0" err="1">
+              <a:rPr lang="en-US" sz="4000" i="1" dirty="0" err="1" smtClean="0">
                 <a:solidFill>
                   <a:schemeClr val="bg1"/>
                 </a:solidFill>
@@ -4297,7 +4297,7 @@
               </a:rPr>
               <a:t>θ</a:t>
             </a:r>
-            <a:endParaRPr lang="en-US" sz="2400" i="1" dirty="0">
+            <a:endParaRPr lang="en-US" sz="4000" i="1" dirty="0" smtClean="0">
               <a:solidFill>
                 <a:schemeClr val="bg1"/>
               </a:solidFill>
@@ -4315,8 +4315,8 @@
         </p:nvSpPr>
         <p:spPr>
           <a:xfrm rot="9276576">
-            <a:off x="292435" y="399082"/>
-            <a:ext cx="342998" cy="366275"/>
+            <a:off x="487392" y="665134"/>
+            <a:ext cx="571663" cy="610459"/>
           </a:xfrm>
           <a:prstGeom prst="blockArc">
             <a:avLst>
@@ -4349,7 +4349,7 @@
           </a:fontRef>
         </p:style>
         <p:txBody>
-          <a:bodyPr lIns="54862" tIns="27431" rIns="54862" bIns="27431" rtlCol="0" anchor="ctr"/>
+          <a:bodyPr rtlCol="0" anchor="ctr"/>
           <a:lstStyle/>
           <a:p>
             <a:pPr algn="ctr"/>
@@ -4371,8 +4371,8 @@
         </p:nvSpPr>
         <p:spPr>
           <a:xfrm>
-            <a:off x="6562626" y="1443272"/>
-            <a:ext cx="712551" cy="712605"/>
+            <a:off x="10937707" y="2405451"/>
+            <a:ext cx="1187585" cy="1187675"/>
           </a:xfrm>
           <a:prstGeom prst="ellipse">
             <a:avLst/>
@@ -4399,11 +4399,11 @@
           </a:fontRef>
         </p:style>
         <p:txBody>
-          <a:bodyPr lIns="54862" tIns="27431" rIns="54862" bIns="27431" rtlCol="0" anchor="ctr"/>
+          <a:bodyPr rtlCol="0" anchor="ctr"/>
           <a:lstStyle/>
           <a:p>
             <a:pPr algn="ctr"/>
-            <a:endParaRPr lang="en-US" sz="2400">
+            <a:endParaRPr lang="en-US" sz="4000">
               <a:latin typeface="Times New Roman"/>
               <a:cs typeface="Times New Roman"/>
             </a:endParaRPr>
@@ -4418,8 +4418,8 @@
         </p:nvSpPr>
         <p:spPr>
           <a:xfrm>
-            <a:off x="5721418" y="2155877"/>
-            <a:ext cx="2508182" cy="445378"/>
+            <a:off x="9535696" y="3593127"/>
+            <a:ext cx="4180304" cy="742297"/>
           </a:xfrm>
           <a:prstGeom prst="rect">
             <a:avLst/>
@@ -4446,11 +4446,11 @@
           </a:fontRef>
         </p:style>
         <p:txBody>
-          <a:bodyPr lIns="54862" tIns="27431" rIns="54862" bIns="27431" rtlCol="0" anchor="ctr"/>
+          <a:bodyPr rtlCol="0" anchor="ctr"/>
           <a:lstStyle/>
           <a:p>
             <a:pPr algn="ctr"/>
-            <a:endParaRPr lang="en-US" sz="2400">
+            <a:endParaRPr lang="en-US" sz="4000">
               <a:latin typeface="Times New Roman"/>
               <a:cs typeface="Times New Roman"/>
             </a:endParaRPr>
@@ -4465,8 +4465,8 @@
         </p:nvSpPr>
         <p:spPr>
           <a:xfrm>
-            <a:off x="5807907" y="221070"/>
-            <a:ext cx="712551" cy="712605"/>
+            <a:off x="9679842" y="368448"/>
+            <a:ext cx="1187585" cy="1187675"/>
           </a:xfrm>
           <a:prstGeom prst="ellipse">
             <a:avLst/>
@@ -4493,11 +4493,11 @@
           </a:fontRef>
         </p:style>
         <p:txBody>
-          <a:bodyPr lIns="54862" tIns="27431" rIns="54862" bIns="27431" rtlCol="0" anchor="ctr"/>
+          <a:bodyPr rtlCol="0" anchor="ctr"/>
           <a:lstStyle/>
           <a:p>
             <a:pPr algn="ctr"/>
-            <a:endParaRPr lang="en-US" sz="2400">
+            <a:endParaRPr lang="en-US" sz="4000">
               <a:latin typeface="Times New Roman"/>
               <a:cs typeface="Times New Roman"/>
             </a:endParaRPr>
@@ -4512,8 +4512,8 @@
         </p:nvCxnSpPr>
         <p:spPr>
           <a:xfrm flipV="1">
-            <a:off x="6918902" y="1779265"/>
-            <a:ext cx="621269" cy="4028"/>
+            <a:off x="11531503" y="2965441"/>
+            <a:ext cx="1035449" cy="6713"/>
           </a:xfrm>
           <a:prstGeom prst="straightConnector1">
             <a:avLst/>
@@ -4548,8 +4548,8 @@
         </p:nvSpPr>
         <p:spPr>
           <a:xfrm rot="5400000">
-            <a:off x="5532032" y="-147116"/>
-            <a:ext cx="2773739" cy="1814042"/>
+            <a:off x="9220053" y="-245194"/>
+            <a:ext cx="4622899" cy="3023403"/>
           </a:xfrm>
           <a:prstGeom prst="arc">
             <a:avLst>
@@ -4574,7 +4574,7 @@
           </a:fontRef>
         </p:style>
         <p:txBody>
-          <a:bodyPr lIns="54862" tIns="27431" rIns="54862" bIns="27431" spcCol="0" rtlCol="0" anchor="ctr"/>
+          <a:bodyPr rtlCol="0" anchor="ctr"/>
           <a:lstStyle/>
           <a:p>
             <a:pPr algn="ctr"/>
@@ -4592,8 +4592,8 @@
         </p:nvCxnSpPr>
         <p:spPr>
           <a:xfrm flipV="1">
-            <a:off x="7825843" y="0"/>
-            <a:ext cx="81" cy="778468"/>
+            <a:off x="13043069" y="0"/>
+            <a:ext cx="135" cy="1297446"/>
           </a:xfrm>
           <a:prstGeom prst="line">
             <a:avLst/>
@@ -4622,8 +4622,8 @@
         </p:nvCxnSpPr>
         <p:spPr>
           <a:xfrm flipV="1">
-            <a:off x="5721138" y="921955"/>
-            <a:ext cx="2508462" cy="42734"/>
+            <a:off x="9535230" y="1536591"/>
+            <a:ext cx="4180770" cy="71224"/>
           </a:xfrm>
           <a:prstGeom prst="line">
             <a:avLst/>
@@ -4655,8 +4655,8 @@
         </p:nvCxnSpPr>
         <p:spPr>
           <a:xfrm flipV="1">
-            <a:off x="6918903" y="2004745"/>
-            <a:ext cx="432584" cy="1"/>
+            <a:off x="11531503" y="3341240"/>
+            <a:ext cx="720973" cy="1"/>
           </a:xfrm>
           <a:prstGeom prst="straightConnector1">
             <a:avLst/>
@@ -4691,8 +4691,8 @@
         </p:nvCxnSpPr>
         <p:spPr>
           <a:xfrm flipV="1">
-            <a:off x="6918902" y="1553417"/>
-            <a:ext cx="759155" cy="9647"/>
+            <a:off x="11531503" y="2589025"/>
+            <a:ext cx="1265259" cy="16079"/>
           </a:xfrm>
           <a:prstGeom prst="straightConnector1">
             <a:avLst/>
@@ -4727,8 +4727,8 @@
         </p:nvCxnSpPr>
         <p:spPr>
           <a:xfrm flipV="1">
-            <a:off x="6918902" y="1328683"/>
-            <a:ext cx="838984" cy="9648"/>
+            <a:off x="11531503" y="2214471"/>
+            <a:ext cx="1398307" cy="16080"/>
           </a:xfrm>
           <a:prstGeom prst="straightConnector1">
             <a:avLst/>
@@ -4763,8 +4763,8 @@
         </p:nvCxnSpPr>
         <p:spPr>
           <a:xfrm>
-            <a:off x="6924010" y="1114488"/>
-            <a:ext cx="854953" cy="0"/>
+            <a:off x="11540015" y="1857480"/>
+            <a:ext cx="1424921" cy="0"/>
           </a:xfrm>
           <a:prstGeom prst="straightConnector1">
             <a:avLst/>
@@ -4799,8 +4799,8 @@
         </p:nvCxnSpPr>
         <p:spPr>
           <a:xfrm flipV="1">
-            <a:off x="6918902" y="933674"/>
-            <a:ext cx="906940" cy="9648"/>
+            <a:off x="11531503" y="1556123"/>
+            <a:ext cx="1511566" cy="16080"/>
           </a:xfrm>
           <a:prstGeom prst="straightConnector1">
             <a:avLst/>
@@ -4835,8 +4835,8 @@
         </p:nvCxnSpPr>
         <p:spPr>
           <a:xfrm flipV="1">
-            <a:off x="6924009" y="768820"/>
-            <a:ext cx="906940" cy="9648"/>
+            <a:off x="11540015" y="1281366"/>
+            <a:ext cx="1511566" cy="16080"/>
           </a:xfrm>
           <a:prstGeom prst="straightConnector1">
             <a:avLst/>
@@ -4871,8 +4871,8 @@
         </p:nvCxnSpPr>
         <p:spPr>
           <a:xfrm flipV="1">
-            <a:off x="6924009" y="580900"/>
-            <a:ext cx="906940" cy="9648"/>
+            <a:off x="11540015" y="968166"/>
+            <a:ext cx="1511566" cy="16080"/>
           </a:xfrm>
           <a:prstGeom prst="straightConnector1">
             <a:avLst/>
@@ -4907,8 +4907,8 @@
         </p:nvCxnSpPr>
         <p:spPr>
           <a:xfrm flipV="1">
-            <a:off x="6924009" y="408704"/>
-            <a:ext cx="906940" cy="9648"/>
+            <a:off x="11540015" y="681173"/>
+            <a:ext cx="1511566" cy="16080"/>
           </a:xfrm>
           <a:prstGeom prst="straightConnector1">
             <a:avLst/>
@@ -4943,8 +4943,8 @@
         </p:nvCxnSpPr>
         <p:spPr>
           <a:xfrm flipV="1">
-            <a:off x="6932295" y="240307"/>
-            <a:ext cx="906940" cy="9648"/>
+            <a:off x="11553825" y="400511"/>
+            <a:ext cx="1511566" cy="16080"/>
           </a:xfrm>
           <a:prstGeom prst="straightConnector1">
             <a:avLst/>
@@ -4979,8 +4979,8 @@
         </p:nvSpPr>
         <p:spPr>
           <a:xfrm>
-            <a:off x="5874709" y="1000187"/>
-            <a:ext cx="1375830" cy="646331"/>
+            <a:off x="9791182" y="1666977"/>
+            <a:ext cx="2293050" cy="1077218"/>
           </a:xfrm>
           <a:prstGeom prst="rect">
             <a:avLst/>
@@ -4988,18 +4988,22 @@
           <a:noFill/>
         </p:spPr>
         <p:txBody>
-          <a:bodyPr wrap="square" lIns="54862" tIns="27431" rIns="54862" bIns="27431" rtlCol="0">
+          <a:bodyPr wrap="square" rtlCol="0">
             <a:spAutoFit/>
           </a:bodyPr>
           <a:lstStyle/>
           <a:p>
             <a:r>
-              <a:rPr lang="en-US" sz="1900" dirty="0">
+              <a:rPr lang="en-US" sz="3200" dirty="0" smtClean="0">
                 <a:latin typeface="Times"/>
                 <a:cs typeface="Times"/>
               </a:rPr>
               <a:t>Boundary Layer</a:t>
             </a:r>
+            <a:endParaRPr lang="en-US" sz="3200" dirty="0">
+              <a:latin typeface="Times"/>
+              <a:cs typeface="Times"/>
+            </a:endParaRPr>
           </a:p>
         </p:txBody>
       </p:sp>
@@ -5011,8 +5015,8 @@
         </p:nvSpPr>
         <p:spPr>
           <a:xfrm>
-            <a:off x="5874709" y="-76201"/>
-            <a:ext cx="1375830" cy="350866"/>
+            <a:off x="9791182" y="-127002"/>
+            <a:ext cx="2293050" cy="584776"/>
           </a:xfrm>
           <a:prstGeom prst="rect">
             <a:avLst/>
@@ -5020,18 +5024,22 @@
           <a:noFill/>
         </p:spPr>
         <p:txBody>
-          <a:bodyPr wrap="square" lIns="54862" tIns="27431" rIns="54862" bIns="27431" rtlCol="0">
+          <a:bodyPr wrap="square" rtlCol="0">
             <a:spAutoFit/>
           </a:bodyPr>
           <a:lstStyle/>
           <a:p>
             <a:r>
-              <a:rPr lang="en-US" sz="1900" dirty="0">
+              <a:rPr lang="en-US" sz="3200" dirty="0" smtClean="0">
                 <a:latin typeface="Times"/>
                 <a:cs typeface="Times"/>
               </a:rPr>
               <a:t>Free Flow</a:t>
             </a:r>
+            <a:endParaRPr lang="en-US" sz="3200" dirty="0">
+              <a:latin typeface="Times"/>
+              <a:cs typeface="Times"/>
+            </a:endParaRPr>
           </a:p>
         </p:txBody>
       </p:sp>
@@ -5043,8 +5051,8 @@
         </p:nvSpPr>
         <p:spPr>
           <a:xfrm>
-            <a:off x="1198598" y="2146775"/>
-            <a:ext cx="403919" cy="350866"/>
+            <a:off x="1997660" y="3577957"/>
+            <a:ext cx="673199" cy="584776"/>
           </a:xfrm>
           <a:prstGeom prst="rect">
             <a:avLst/>
@@ -5052,18 +5060,22 @@
           <a:noFill/>
         </p:spPr>
         <p:txBody>
-          <a:bodyPr wrap="square" lIns="54862" tIns="27431" rIns="54862" bIns="27431" rtlCol="0">
+          <a:bodyPr wrap="square" rtlCol="0">
             <a:spAutoFit/>
           </a:bodyPr>
           <a:lstStyle/>
           <a:p>
             <a:r>
-              <a:rPr lang="en-US" sz="1900" b="1" dirty="0">
+              <a:rPr lang="en-US" sz="3200" b="1" dirty="0" smtClean="0">
                 <a:latin typeface="Times"/>
                 <a:cs typeface="Times"/>
               </a:rPr>
               <a:t>a.</a:t>
             </a:r>
+            <a:endParaRPr lang="en-US" sz="3200" b="1" dirty="0">
+              <a:latin typeface="Times"/>
+              <a:cs typeface="Times"/>
+            </a:endParaRPr>
           </a:p>
         </p:txBody>
       </p:sp>
@@ -5075,8 +5087,8 @@
         </p:nvSpPr>
         <p:spPr>
           <a:xfrm>
-            <a:off x="4082681" y="2146775"/>
-            <a:ext cx="403919" cy="350866"/>
+            <a:off x="6804467" y="3577957"/>
+            <a:ext cx="673199" cy="584776"/>
           </a:xfrm>
           <a:prstGeom prst="rect">
             <a:avLst/>
@@ -5084,18 +5096,29 @@
           <a:noFill/>
         </p:spPr>
         <p:txBody>
-          <a:bodyPr wrap="square" lIns="54862" tIns="27431" rIns="54862" bIns="27431" rtlCol="0">
+          <a:bodyPr wrap="square" rtlCol="0">
             <a:spAutoFit/>
           </a:bodyPr>
           <a:lstStyle/>
           <a:p>
             <a:r>
-              <a:rPr lang="en-US" sz="1900" b="1" dirty="0">
+              <a:rPr lang="en-US" sz="3200" b="1" dirty="0">
                 <a:latin typeface="Times"/>
                 <a:cs typeface="Times"/>
               </a:rPr>
-              <a:t>b.</a:t>
-            </a:r>
+              <a:t>b</a:t>
+            </a:r>
+            <a:r>
+              <a:rPr lang="en-US" sz="3200" b="1" dirty="0" smtClean="0">
+                <a:latin typeface="Times"/>
+                <a:cs typeface="Times"/>
+              </a:rPr>
+              <a:t>.</a:t>
+            </a:r>
+            <a:endParaRPr lang="en-US" sz="3200" b="1" dirty="0">
+              <a:latin typeface="Times"/>
+              <a:cs typeface="Times"/>
+            </a:endParaRPr>
           </a:p>
         </p:txBody>
       </p:sp>
@@ -5107,8 +5130,8 @@
         </p:nvSpPr>
         <p:spPr>
           <a:xfrm>
-            <a:off x="6908195" y="2155875"/>
-            <a:ext cx="403919" cy="350866"/>
+            <a:off x="11513658" y="3593126"/>
+            <a:ext cx="673199" cy="584776"/>
           </a:xfrm>
           <a:prstGeom prst="rect">
             <a:avLst/>
@@ -5116,31 +5139,42 @@
           <a:noFill/>
         </p:spPr>
         <p:txBody>
-          <a:bodyPr wrap="square" lIns="54862" tIns="27431" rIns="54862" bIns="27431" rtlCol="0">
+          <a:bodyPr wrap="square" rtlCol="0">
             <a:spAutoFit/>
           </a:bodyPr>
           <a:lstStyle/>
           <a:p>
             <a:r>
-              <a:rPr lang="en-US" sz="1900" b="1" dirty="0">
+              <a:rPr lang="en-US" sz="3200" b="1" dirty="0">
                 <a:latin typeface="Times"/>
                 <a:cs typeface="Times"/>
               </a:rPr>
-              <a:t>c.</a:t>
-            </a:r>
+              <a:t>c</a:t>
+            </a:r>
+            <a:r>
+              <a:rPr lang="en-US" sz="3200" b="1" dirty="0" smtClean="0">
+                <a:latin typeface="Times"/>
+                <a:cs typeface="Times"/>
+              </a:rPr>
+              <a:t>.</a:t>
+            </a:r>
+            <a:endParaRPr lang="en-US" sz="3200" b="1" dirty="0">
+              <a:latin typeface="Times"/>
+              <a:cs typeface="Times"/>
+            </a:endParaRPr>
           </a:p>
         </p:txBody>
       </p:sp>
       <p:cxnSp>
         <p:nvCxnSpPr>
-          <p:cNvPr id="120" name="Straight Arrow Connector 119"/>
+          <p:cNvPr id="60" name="Straight Arrow Connector 59"/>
           <p:cNvCxnSpPr/>
           <p:nvPr/>
         </p:nvCxnSpPr>
         <p:spPr>
-          <a:xfrm>
-            <a:off x="7930472" y="985648"/>
-            <a:ext cx="0" cy="1169717"/>
+          <a:xfrm flipV="1">
+            <a:off x="13504333" y="1572203"/>
+            <a:ext cx="0" cy="2005754"/>
           </a:xfrm>
           <a:prstGeom prst="straightConnector1">
             <a:avLst/>
@@ -5170,19 +5204,21 @@
       </p:cxnSp>
       <p:sp>
         <p:nvSpPr>
-          <p:cNvPr id="70" name="TextBox 69"/>
+          <p:cNvPr id="62" name="TextBox 61"/>
           <p:cNvSpPr txBox="1"/>
           <p:nvPr/>
         </p:nvSpPr>
         <p:spPr>
           <a:xfrm>
-            <a:off x="7907844" y="1338868"/>
-            <a:ext cx="216986" cy="492443"/>
+            <a:off x="13304763" y="2197689"/>
+            <a:ext cx="1351486" cy="584776"/>
           </a:xfrm>
           <a:prstGeom prst="rect">
             <a:avLst/>
           </a:prstGeom>
-          <a:noFill/>
+          <a:solidFill>
+            <a:schemeClr val="bg1"/>
+          </a:solidFill>
         </p:spPr>
         <p:txBody>
           <a:bodyPr wrap="square" rtlCol="0">
@@ -5191,13 +5227,13 @@
           <a:lstStyle/>
           <a:p>
             <a:r>
-              <a:rPr lang="en-US" sz="2600" i="1" dirty="0" smtClean="0">
+              <a:rPr lang="en-US" sz="3200" i="1" dirty="0" smtClean="0">
                 <a:latin typeface="Times"/>
                 <a:cs typeface="Times"/>
               </a:rPr>
               <a:t>h</a:t>
             </a:r>
-            <a:endParaRPr lang="en-US" sz="2600" i="1" dirty="0">
+            <a:endParaRPr lang="en-US" sz="3200" i="1" dirty="0">
               <a:latin typeface="Times"/>
               <a:cs typeface="Times"/>
             </a:endParaRPr>

</xml_diff>

<commit_message>
Small changes and added Algorithm description
</commit_message>
<xml_diff>
--- a/RA-L/pictures/pdf/friction.pptx
+++ b/RA-L/pictures/pdf/friction.pptx
@@ -288,7 +288,7 @@
           <a:p>
             <a:fld id="{6666019B-6789-7642-8563-2C9E17E98A28}" type="datetimeFigureOut">
               <a:rPr lang="en-US" smtClean="0"/>
-              <a:t>9/10/16</a:t>
+              <a:t>12/6/16</a:t>
             </a:fld>
             <a:endParaRPr lang="en-US"/>
           </a:p>
@@ -458,7 +458,7 @@
           <a:p>
             <a:fld id="{6666019B-6789-7642-8563-2C9E17E98A28}" type="datetimeFigureOut">
               <a:rPr lang="en-US" smtClean="0"/>
-              <a:t>9/10/16</a:t>
+              <a:t>12/6/16</a:t>
             </a:fld>
             <a:endParaRPr lang="en-US"/>
           </a:p>
@@ -638,7 +638,7 @@
           <a:p>
             <a:fld id="{6666019B-6789-7642-8563-2C9E17E98A28}" type="datetimeFigureOut">
               <a:rPr lang="en-US" smtClean="0"/>
-              <a:t>9/10/16</a:t>
+              <a:t>12/6/16</a:t>
             </a:fld>
             <a:endParaRPr lang="en-US"/>
           </a:p>
@@ -808,7 +808,7 @@
           <a:p>
             <a:fld id="{6666019B-6789-7642-8563-2C9E17E98A28}" type="datetimeFigureOut">
               <a:rPr lang="en-US" smtClean="0"/>
-              <a:t>9/10/16</a:t>
+              <a:t>12/6/16</a:t>
             </a:fld>
             <a:endParaRPr lang="en-US"/>
           </a:p>
@@ -1054,7 +1054,7 @@
           <a:p>
             <a:fld id="{6666019B-6789-7642-8563-2C9E17E98A28}" type="datetimeFigureOut">
               <a:rPr lang="en-US" smtClean="0"/>
-              <a:t>9/10/16</a:t>
+              <a:t>12/6/16</a:t>
             </a:fld>
             <a:endParaRPr lang="en-US"/>
           </a:p>
@@ -1342,7 +1342,7 @@
           <a:p>
             <a:fld id="{6666019B-6789-7642-8563-2C9E17E98A28}" type="datetimeFigureOut">
               <a:rPr lang="en-US" smtClean="0"/>
-              <a:t>9/10/16</a:t>
+              <a:t>12/6/16</a:t>
             </a:fld>
             <a:endParaRPr lang="en-US"/>
           </a:p>
@@ -1769,7 +1769,7 @@
           <a:p>
             <a:fld id="{6666019B-6789-7642-8563-2C9E17E98A28}" type="datetimeFigureOut">
               <a:rPr lang="en-US" smtClean="0"/>
-              <a:t>9/10/16</a:t>
+              <a:t>12/6/16</a:t>
             </a:fld>
             <a:endParaRPr lang="en-US"/>
           </a:p>
@@ -1887,7 +1887,7 @@
           <a:p>
             <a:fld id="{6666019B-6789-7642-8563-2C9E17E98A28}" type="datetimeFigureOut">
               <a:rPr lang="en-US" smtClean="0"/>
-              <a:t>9/10/16</a:t>
+              <a:t>12/6/16</a:t>
             </a:fld>
             <a:endParaRPr lang="en-US"/>
           </a:p>
@@ -1982,7 +1982,7 @@
           <a:p>
             <a:fld id="{6666019B-6789-7642-8563-2C9E17E98A28}" type="datetimeFigureOut">
               <a:rPr lang="en-US" smtClean="0"/>
-              <a:t>9/10/16</a:t>
+              <a:t>12/6/16</a:t>
             </a:fld>
             <a:endParaRPr lang="en-US"/>
           </a:p>
@@ -2259,7 +2259,7 @@
           <a:p>
             <a:fld id="{6666019B-6789-7642-8563-2C9E17E98A28}" type="datetimeFigureOut">
               <a:rPr lang="en-US" smtClean="0"/>
-              <a:t>9/10/16</a:t>
+              <a:t>12/6/16</a:t>
             </a:fld>
             <a:endParaRPr lang="en-US"/>
           </a:p>
@@ -2512,7 +2512,7 @@
           <a:p>
             <a:fld id="{6666019B-6789-7642-8563-2C9E17E98A28}" type="datetimeFigureOut">
               <a:rPr lang="en-US" smtClean="0"/>
-              <a:t>9/10/16</a:t>
+              <a:t>12/6/16</a:t>
             </a:fld>
             <a:endParaRPr lang="en-US"/>
           </a:p>
@@ -2725,7 +2725,7 @@
           <a:p>
             <a:fld id="{6666019B-6789-7642-8563-2C9E17E98A28}" type="datetimeFigureOut">
               <a:rPr lang="en-US" smtClean="0"/>
-              <a:t>9/10/16</a:t>
+              <a:t>12/6/16</a:t>
             </a:fld>
             <a:endParaRPr lang="en-US"/>
           </a:p>
@@ -4511,9 +4511,9 @@
           <p:nvPr/>
         </p:nvCxnSpPr>
         <p:spPr>
-          <a:xfrm flipV="1">
-            <a:off x="11531503" y="2965441"/>
-            <a:ext cx="1035449" cy="6713"/>
+          <a:xfrm>
+            <a:off x="11531503" y="2972155"/>
+            <a:ext cx="655354" cy="10640"/>
           </a:xfrm>
           <a:prstGeom prst="straightConnector1">
             <a:avLst/>
@@ -4540,60 +4540,16 @@
           </a:fontRef>
         </p:style>
       </p:cxnSp>
-      <p:sp>
-        <p:nvSpPr>
-          <p:cNvPr id="5" name="Arc 4"/>
-          <p:cNvSpPr/>
-          <p:nvPr/>
-        </p:nvSpPr>
-        <p:spPr>
-          <a:xfrm rot="5400000">
-            <a:off x="9220053" y="-245194"/>
-            <a:ext cx="4622899" cy="3023403"/>
-          </a:xfrm>
-          <a:prstGeom prst="arc">
-            <a:avLst>
-              <a:gd name="adj1" fmla="val 16270353"/>
-              <a:gd name="adj2" fmla="val 12981"/>
-            </a:avLst>
-          </a:prstGeom>
-          <a:noFill/>
-        </p:spPr>
-        <p:style>
-          <a:lnRef idx="2">
-            <a:schemeClr val="accent1"/>
-          </a:lnRef>
-          <a:fillRef idx="0">
-            <a:schemeClr val="accent1"/>
-          </a:fillRef>
-          <a:effectRef idx="1">
-            <a:schemeClr val="accent1"/>
-          </a:effectRef>
-          <a:fontRef idx="minor">
-            <a:schemeClr val="tx1"/>
-          </a:fontRef>
-        </p:style>
-        <p:txBody>
-          <a:bodyPr rtlCol="0" anchor="ctr"/>
-          <a:lstStyle/>
-          <a:p>
-            <a:pPr algn="ctr"/>
-            <a:endParaRPr lang="en-US"/>
-          </a:p>
-        </p:txBody>
-      </p:sp>
       <p:cxnSp>
         <p:nvCxnSpPr>
           <p:cNvPr id="14" name="Straight Connector 13"/>
-          <p:cNvCxnSpPr>
-            <a:stCxn id="5" idx="0"/>
-          </p:cNvCxnSpPr>
+          <p:cNvCxnSpPr/>
           <p:nvPr/>
         </p:nvCxnSpPr>
         <p:spPr>
-          <a:xfrm flipV="1">
-            <a:off x="13043069" y="0"/>
-            <a:ext cx="135" cy="1297446"/>
+          <a:xfrm flipH="1" flipV="1">
+            <a:off x="13043204" y="0"/>
+            <a:ext cx="22187" cy="1536591"/>
           </a:xfrm>
           <a:prstGeom prst="line">
             <a:avLst/>
@@ -4656,7 +4612,7 @@
         <p:spPr>
           <a:xfrm flipV="1">
             <a:off x="11531503" y="3341240"/>
-            <a:ext cx="720973" cy="1"/>
+            <a:ext cx="552729" cy="2"/>
           </a:xfrm>
           <a:prstGeom prst="straightConnector1">
             <a:avLst/>
@@ -4692,7 +4648,7 @@
         <p:spPr>
           <a:xfrm flipV="1">
             <a:off x="11531503" y="2589025"/>
-            <a:ext cx="1265259" cy="16079"/>
+            <a:ext cx="935664" cy="16080"/>
           </a:xfrm>
           <a:prstGeom prst="straightConnector1">
             <a:avLst/>
@@ -4727,8 +4683,8 @@
         </p:nvCxnSpPr>
         <p:spPr>
           <a:xfrm flipV="1">
-            <a:off x="11531503" y="2214471"/>
-            <a:ext cx="1398307" cy="16080"/>
+            <a:off x="11531503" y="2190832"/>
+            <a:ext cx="1147330" cy="39719"/>
           </a:xfrm>
           <a:prstGeom prst="straightConnector1">
             <a:avLst/>
@@ -4763,8 +4719,8 @@
         </p:nvCxnSpPr>
         <p:spPr>
           <a:xfrm>
-            <a:off x="11540015" y="1857480"/>
-            <a:ext cx="1424921" cy="0"/>
+            <a:off x="11553825" y="1857480"/>
+            <a:ext cx="1368777" cy="0"/>
           </a:xfrm>
           <a:prstGeom prst="straightConnector1">
             <a:avLst/>
@@ -5240,6 +5196,36 @@
           </a:p>
         </p:txBody>
       </p:sp>
+      <p:cxnSp>
+        <p:nvCxnSpPr>
+          <p:cNvPr id="3" name="Straight Connector 2"/>
+          <p:cNvCxnSpPr/>
+          <p:nvPr/>
+        </p:nvCxnSpPr>
+        <p:spPr>
+          <a:xfrm flipV="1">
+            <a:off x="11874500" y="1572203"/>
+            <a:ext cx="1168569" cy="2005754"/>
+          </a:xfrm>
+          <a:prstGeom prst="line">
+            <a:avLst/>
+          </a:prstGeom>
+        </p:spPr>
+        <p:style>
+          <a:lnRef idx="2">
+            <a:schemeClr val="accent1"/>
+          </a:lnRef>
+          <a:fillRef idx="0">
+            <a:schemeClr val="accent1"/>
+          </a:fillRef>
+          <a:effectRef idx="1">
+            <a:schemeClr val="accent1"/>
+          </a:effectRef>
+          <a:fontRef idx="minor">
+            <a:schemeClr val="tx1"/>
+          </a:fontRef>
+        </p:style>
+      </p:cxnSp>
     </p:spTree>
     <p:extLst>
       <p:ext uri="{BB962C8B-B14F-4D97-AF65-F5344CB8AC3E}">

</xml_diff>